<commit_message>
added starting point, snippets, and added to presentation slides
</commit_message>
<xml_diff>
--- a/workshop3/presentation.pptx
+++ b/workshop3/presentation.pptx
@@ -5,10 +5,10 @@
     <p:sldMasterId id="2147483648" r:id="rId2"/>
   </p:sldMasterIdLst>
   <p:notesMasterIdLst>
-    <p:notesMasterId r:id="rId11"/>
+    <p:notesMasterId r:id="rId14"/>
   </p:notesMasterIdLst>
   <p:handoutMasterIdLst>
-    <p:handoutMasterId r:id="rId12"/>
+    <p:handoutMasterId r:id="rId15"/>
   </p:handoutMasterIdLst>
   <p:sldIdLst>
     <p:sldId id="256" r:id="rId3"/>
@@ -17,8 +17,11 @@
     <p:sldId id="283" r:id="rId6"/>
     <p:sldId id="281" r:id="rId7"/>
     <p:sldId id="274" r:id="rId8"/>
-    <p:sldId id="282" r:id="rId9"/>
-    <p:sldId id="284" r:id="rId10"/>
+    <p:sldId id="285" r:id="rId9"/>
+    <p:sldId id="286" r:id="rId10"/>
+    <p:sldId id="287" r:id="rId11"/>
+    <p:sldId id="282" r:id="rId12"/>
+    <p:sldId id="284" r:id="rId13"/>
   </p:sldIdLst>
   <p:sldSz cx="12192000" cy="6858000"/>
   <p:notesSz cx="6858000" cy="9144000"/>
@@ -4088,6 +4091,251 @@
 </p:sld>
 </file>
 
+<file path=ppt/slides/slide10.xml><?xml version="1.0" encoding="utf-8"?>
+<p:sld xmlns:a="http://schemas.openxmlformats.org/drawingml/2006/main" xmlns:r="http://schemas.openxmlformats.org/officeDocument/2006/relationships" xmlns:p="http://schemas.openxmlformats.org/presentationml/2006/main">
+  <p:cSld>
+    <p:spTree>
+      <p:nvGrpSpPr>
+        <p:cNvPr id="1" name=""/>
+        <p:cNvGrpSpPr/>
+        <p:nvPr/>
+      </p:nvGrpSpPr>
+      <p:grpSpPr>
+        <a:xfrm>
+          <a:off x="0" y="0"/>
+          <a:ext cx="0" cy="0"/>
+          <a:chOff x="0" y="0"/>
+          <a:chExt cx="0" cy="0"/>
+        </a:xfrm>
+      </p:grpSpPr>
+      <p:sp>
+        <p:nvSpPr>
+          <p:cNvPr id="2" name="Title 1"/>
+          <p:cNvSpPr>
+            <a:spLocks noGrp="1"/>
+          </p:cNvSpPr>
+          <p:nvPr>
+            <p:ph type="title"/>
+          </p:nvPr>
+        </p:nvSpPr>
+        <p:spPr>
+          <a:xfrm>
+            <a:off x="756745" y="132347"/>
+            <a:ext cx="11650717" cy="6316579"/>
+          </a:xfrm>
+        </p:spPr>
+        <p:txBody>
+          <a:bodyPr>
+            <a:normAutofit/>
+          </a:bodyPr>
+          <a:lstStyle/>
+          <a:p>
+            <a:r>
+              <a:rPr lang="en-US" sz="4900" dirty="0">
+                <a:solidFill>
+                  <a:schemeClr val="accent1"/>
+                </a:solidFill>
+              </a:rPr>
+              <a:t>5 minute break</a:t>
+            </a:r>
+            <a:br>
+              <a:rPr lang="en-US" dirty="0"/>
+            </a:br>
+            <a:br>
+              <a:rPr lang="en-US" dirty="0"/>
+            </a:br>
+            <a:r>
+              <a:rPr lang="en-US" dirty="0"/>
+              <a:t>If you need help, ask now! </a:t>
+            </a:r>
+            <a:br>
+              <a:rPr lang="en-US" dirty="0"/>
+            </a:br>
+            <a:br>
+              <a:rPr lang="en-US" dirty="0"/>
+            </a:br>
+            <a:r>
+              <a:rPr lang="en-US" dirty="0"/>
+              <a:t>Feedback:</a:t>
+            </a:r>
+            <a:br>
+              <a:rPr lang="en-US" dirty="0"/>
+            </a:br>
+            <a:r>
+              <a:rPr lang="en-US" sz="13800" dirty="0">
+                <a:latin typeface="Calibri Light" panose="020F0302020204030204" pitchFamily="34" charset="0"/>
+              </a:rPr>
+              <a:t>goo.gl/AMNFLQ</a:t>
+            </a:r>
+            <a:br>
+              <a:rPr lang="en-US" sz="9600" dirty="0">
+                <a:latin typeface="Calibri Light" panose="020F0302020204030204" pitchFamily="34" charset="0"/>
+              </a:rPr>
+            </a:br>
+            <a:br>
+              <a:rPr lang="en-US" dirty="0"/>
+            </a:br>
+            <a:endParaRPr lang="en-US" dirty="0"/>
+          </a:p>
+        </p:txBody>
+      </p:sp>
+    </p:spTree>
+    <p:extLst>
+      <p:ext uri="{BB962C8B-B14F-4D97-AF65-F5344CB8AC3E}">
+        <p14:creationId xmlns:p14="http://schemas.microsoft.com/office/powerpoint/2010/main" val="4112575831"/>
+      </p:ext>
+    </p:extLst>
+  </p:cSld>
+  <p:clrMapOvr>
+    <a:masterClrMapping/>
+  </p:clrMapOvr>
+  <mc:AlternateContent xmlns:mc="http://schemas.openxmlformats.org/markup-compatibility/2006" xmlns:p14="http://schemas.microsoft.com/office/powerpoint/2010/main">
+    <mc:Choice Requires="p14">
+      <p:transition spd="med" p14:dur="700">
+        <p:fade/>
+      </p:transition>
+    </mc:Choice>
+    <mc:Fallback xmlns="">
+      <p:transition spd="med">
+        <p:fade/>
+      </p:transition>
+    </mc:Fallback>
+  </mc:AlternateContent>
+</p:sld>
+</file>
+
+<file path=ppt/slides/slide11.xml><?xml version="1.0" encoding="utf-8"?>
+<p:sld xmlns:a="http://schemas.openxmlformats.org/drawingml/2006/main" xmlns:r="http://schemas.openxmlformats.org/officeDocument/2006/relationships" xmlns:p="http://schemas.openxmlformats.org/presentationml/2006/main">
+  <p:cSld>
+    <p:spTree>
+      <p:nvGrpSpPr>
+        <p:cNvPr id="1" name=""/>
+        <p:cNvGrpSpPr/>
+        <p:nvPr/>
+      </p:nvGrpSpPr>
+      <p:grpSpPr>
+        <a:xfrm>
+          <a:off x="0" y="0"/>
+          <a:ext cx="0" cy="0"/>
+          <a:chOff x="0" y="0"/>
+          <a:chExt cx="0" cy="0"/>
+        </a:xfrm>
+      </p:grpSpPr>
+      <p:sp>
+        <p:nvSpPr>
+          <p:cNvPr id="2" name="Title 1"/>
+          <p:cNvSpPr>
+            <a:spLocks noGrp="1"/>
+          </p:cNvSpPr>
+          <p:nvPr>
+            <p:ph type="title"/>
+          </p:nvPr>
+        </p:nvSpPr>
+        <p:spPr>
+          <a:xfrm>
+            <a:off x="0" y="23267"/>
+            <a:ext cx="9509760" cy="686876"/>
+          </a:xfrm>
+        </p:spPr>
+        <p:txBody>
+          <a:bodyPr/>
+          <a:lstStyle/>
+          <a:p>
+            <a:r>
+              <a:rPr lang="en-US" dirty="0"/>
+              <a:t>Workshop4?</a:t>
+            </a:r>
+          </a:p>
+        </p:txBody>
+      </p:sp>
+      <p:sp>
+        <p:nvSpPr>
+          <p:cNvPr id="3" name="Content Placeholder 2"/>
+          <p:cNvSpPr>
+            <a:spLocks noGrp="1"/>
+          </p:cNvSpPr>
+          <p:nvPr>
+            <p:ph idx="1"/>
+          </p:nvPr>
+        </p:nvSpPr>
+        <p:spPr>
+          <a:xfrm>
+            <a:off x="0" y="932189"/>
+            <a:ext cx="12192000" cy="5612990"/>
+          </a:xfrm>
+        </p:spPr>
+        <p:txBody>
+          <a:bodyPr>
+            <a:normAutofit/>
+          </a:bodyPr>
+          <a:lstStyle/>
+          <a:p>
+            <a:r>
+              <a:rPr lang="en-US" sz="3000" dirty="0"/>
+              <a:t>Tuesday 4/12</a:t>
+            </a:r>
+          </a:p>
+          <a:p>
+            <a:r>
+              <a:rPr lang="en-US" sz="3000" dirty="0"/>
+              <a:t>Make sure you vote on the next workshop!</a:t>
+            </a:r>
+          </a:p>
+          <a:p>
+            <a:pPr marL="45720" indent="0">
+              <a:buNone/>
+            </a:pPr>
+            <a:endParaRPr lang="en-US" sz="3000" dirty="0"/>
+          </a:p>
+          <a:p>
+            <a:pPr marL="45720" indent="0">
+              <a:buNone/>
+            </a:pPr>
+            <a:r>
+              <a:rPr lang="en-US" sz="3000" dirty="0"/>
+              <a:t> </a:t>
+            </a:r>
+            <a:r>
+              <a:rPr lang="en-US" sz="13800" dirty="0">
+                <a:latin typeface="Calibri Light" panose="020F0302020204030204" pitchFamily="34" charset="0"/>
+              </a:rPr>
+              <a:t>goo.gl/AMNFLQ</a:t>
+            </a:r>
+            <a:endParaRPr lang="en-US" dirty="0"/>
+          </a:p>
+          <a:p>
+            <a:endParaRPr lang="en-US" dirty="0"/>
+          </a:p>
+          <a:p>
+            <a:endParaRPr lang="en-US" dirty="0"/>
+          </a:p>
+        </p:txBody>
+      </p:sp>
+    </p:spTree>
+    <p:extLst>
+      <p:ext uri="{BB962C8B-B14F-4D97-AF65-F5344CB8AC3E}">
+        <p14:creationId xmlns:p14="http://schemas.microsoft.com/office/powerpoint/2010/main" val="3561944362"/>
+      </p:ext>
+    </p:extLst>
+  </p:cSld>
+  <p:clrMapOvr>
+    <a:masterClrMapping/>
+  </p:clrMapOvr>
+  <mc:AlternateContent xmlns:mc="http://schemas.openxmlformats.org/markup-compatibility/2006" xmlns:p14="http://schemas.microsoft.com/office/powerpoint/2010/main">
+    <mc:Choice Requires="p14">
+      <p:transition spd="med" p14:dur="700">
+        <p:fade/>
+      </p:transition>
+    </mc:Choice>
+    <mc:Fallback xmlns="">
+      <p:transition spd="med">
+        <p:fade/>
+      </p:transition>
+    </mc:Fallback>
+  </mc:AlternateContent>
+</p:sld>
+</file>
+
 <file path=ppt/slides/slide2.xml><?xml version="1.0" encoding="utf-8"?>
 <p:sld xmlns:a="http://schemas.openxmlformats.org/drawingml/2006/main" xmlns:r="http://schemas.openxmlformats.org/officeDocument/2006/relationships" xmlns:p="http://schemas.openxmlformats.org/presentationml/2006/main">
   <p:cSld>
@@ -5101,81 +5349,51 @@
           <a:chExt cx="0" cy="0"/>
         </a:xfrm>
       </p:grpSpPr>
-      <p:sp>
-        <p:nvSpPr>
-          <p:cNvPr id="2" name="Title 1"/>
-          <p:cNvSpPr>
-            <a:spLocks noGrp="1"/>
-          </p:cNvSpPr>
-          <p:nvPr>
-            <p:ph type="title"/>
-          </p:nvPr>
-        </p:nvSpPr>
-        <p:spPr>
-          <a:xfrm>
-            <a:off x="756745" y="132347"/>
-            <a:ext cx="11650717" cy="6316579"/>
-          </a:xfrm>
-        </p:spPr>
-        <p:txBody>
-          <a:bodyPr>
-            <a:normAutofit/>
-          </a:bodyPr>
-          <a:lstStyle/>
-          <a:p>
-            <a:r>
-              <a:rPr lang="en-US" sz="4900" dirty="0">
+      <p:pic>
+        <p:nvPicPr>
+          <p:cNvPr id="1026" name="Picture 2" descr="http://puu.sh/nXpl5/48ee1af809.png"/>
+          <p:cNvPicPr>
+            <a:picLocks noChangeAspect="1" noChangeArrowheads="1"/>
+          </p:cNvPicPr>
+          <p:nvPr/>
+        </p:nvPicPr>
+        <p:blipFill>
+          <a:blip r:embed="rId2">
+            <a:extLst>
+              <a:ext uri="{28A0092B-C50C-407E-A947-70E740481C1C}">
+                <a14:useLocalDpi xmlns:a14="http://schemas.microsoft.com/office/drawing/2010/main" val="0"/>
+              </a:ext>
+            </a:extLst>
+          </a:blip>
+          <a:srcRect/>
+          <a:stretch>
+            <a:fillRect/>
+          </a:stretch>
+        </p:blipFill>
+        <p:spPr bwMode="auto">
+          <a:xfrm>
+            <a:off x="2495015" y="-9291"/>
+            <a:ext cx="7195250" cy="6867291"/>
+          </a:xfrm>
+          <a:prstGeom prst="rect">
+            <a:avLst/>
+          </a:prstGeom>
+          <a:noFill/>
+          <a:extLst>
+            <a:ext uri="{909E8E84-426E-40DD-AFC4-6F175D3DCCD1}">
+              <a14:hiddenFill xmlns:a14="http://schemas.microsoft.com/office/drawing/2010/main">
                 <a:solidFill>
-                  <a:schemeClr val="accent1"/>
+                  <a:srgbClr val="FFFFFF"/>
                 </a:solidFill>
-              </a:rPr>
-              <a:t>5 minute break</a:t>
-            </a:r>
-            <a:br>
-              <a:rPr lang="en-US" dirty="0"/>
-            </a:br>
-            <a:br>
-              <a:rPr lang="en-US" dirty="0"/>
-            </a:br>
-            <a:r>
-              <a:rPr lang="en-US" dirty="0"/>
-              <a:t>If you need help, ask now! </a:t>
-            </a:r>
-            <a:br>
-              <a:rPr lang="en-US" dirty="0"/>
-            </a:br>
-            <a:br>
-              <a:rPr lang="en-US" dirty="0"/>
-            </a:br>
-            <a:r>
-              <a:rPr lang="en-US" dirty="0"/>
-              <a:t>Feedback:</a:t>
-            </a:r>
-            <a:br>
-              <a:rPr lang="en-US" dirty="0"/>
-            </a:br>
-            <a:r>
-              <a:rPr lang="en-US" sz="13800" dirty="0">
-                <a:latin typeface="Calibri Light" panose="020F0302020204030204" pitchFamily="34" charset="0"/>
-              </a:rPr>
-              <a:t>goo.gl/AMNFLQ</a:t>
-            </a:r>
-            <a:br>
-              <a:rPr lang="en-US" sz="9600" dirty="0">
-                <a:latin typeface="Calibri Light" panose="020F0302020204030204" pitchFamily="34" charset="0"/>
-              </a:rPr>
-            </a:br>
-            <a:br>
-              <a:rPr lang="en-US" dirty="0"/>
-            </a:br>
-            <a:endParaRPr lang="en-US" dirty="0"/>
-          </a:p>
-        </p:txBody>
-      </p:sp>
+              </a14:hiddenFill>
+            </a:ext>
+          </a:extLst>
+        </p:spPr>
+      </p:pic>
     </p:spTree>
     <p:extLst>
       <p:ext uri="{BB962C8B-B14F-4D97-AF65-F5344CB8AC3E}">
-        <p14:creationId xmlns:p14="http://schemas.microsoft.com/office/powerpoint/2010/main" val="4112575831"/>
+        <p14:creationId xmlns:p14="http://schemas.microsoft.com/office/powerpoint/2010/main" val="724608058"/>
       </p:ext>
     </p:extLst>
   </p:cSld>
@@ -5226,8 +5444,8 @@
         </p:nvSpPr>
         <p:spPr>
           <a:xfrm>
-            <a:off x="0" y="23267"/>
-            <a:ext cx="9509760" cy="686876"/>
+            <a:off x="162952" y="21115"/>
+            <a:ext cx="9509760" cy="1233424"/>
           </a:xfrm>
         </p:spPr>
         <p:txBody>
@@ -5236,7 +5454,7 @@
           <a:p>
             <a:r>
               <a:rPr lang="en-US" dirty="0"/>
-              <a:t>Workshop4?</a:t>
+              <a:t>Angular Material</a:t>
             </a:r>
           </a:p>
         </p:txBody>
@@ -5253,61 +5471,1235 @@
         </p:nvSpPr>
         <p:spPr>
           <a:xfrm>
-            <a:off x="0" y="932189"/>
-            <a:ext cx="12192000" cy="5612990"/>
-          </a:xfrm>
-        </p:spPr>
-        <p:txBody>
-          <a:bodyPr>
-            <a:normAutofit/>
-          </a:bodyPr>
+            <a:off x="436243" y="1404562"/>
+            <a:ext cx="9509760" cy="4127627"/>
+          </a:xfrm>
+        </p:spPr>
+        <p:txBody>
+          <a:bodyPr/>
           <a:lstStyle/>
           <a:p>
             <a:r>
-              <a:rPr lang="en-US" sz="3000" dirty="0"/>
-              <a:t>Tuesday 4/12</a:t>
-            </a:r>
-          </a:p>
-          <a:p>
-            <a:r>
-              <a:rPr lang="en-US" sz="3000" dirty="0"/>
-              <a:t>Make sure you vote on the next workshop!</a:t>
-            </a:r>
-          </a:p>
-          <a:p>
-            <a:pPr marL="45720" indent="0">
-              <a:buNone/>
-            </a:pPr>
-            <a:endParaRPr lang="en-US" sz="3000" dirty="0"/>
-          </a:p>
-          <a:p>
-            <a:pPr marL="45720" indent="0">
-              <a:buNone/>
-            </a:pPr>
-            <a:r>
-              <a:rPr lang="en-US" sz="3000" dirty="0"/>
-              <a:t> </a:t>
-            </a:r>
-            <a:r>
-              <a:rPr lang="en-US" sz="13800" dirty="0">
-                <a:latin typeface="Calibri Light" panose="020F0302020204030204" pitchFamily="34" charset="0"/>
-              </a:rPr>
-              <a:t>goo.gl/AMNFLQ</a:t>
-            </a:r>
+              <a:rPr lang="en-US" dirty="0"/>
+              <a:t>Prebuilt directives for AngularJS</a:t>
+            </a:r>
+          </a:p>
+          <a:p>
+            <a:pPr lvl="1"/>
+            <a:r>
+              <a:rPr lang="en-US" dirty="0"/>
+              <a:t>Ready to use with AngularJS</a:t>
+            </a:r>
+          </a:p>
+          <a:p>
+            <a:r>
+              <a:rPr lang="en-US" dirty="0"/>
+              <a:t>Adhere to Material Design specs</a:t>
+            </a:r>
+          </a:p>
+          <a:p>
+            <a:r>
+              <a:rPr lang="en-US" dirty="0"/>
+              <a:t>Think of it as HTML 2.0+</a:t>
+            </a:r>
+          </a:p>
+          <a:p>
+            <a:r>
+              <a:rPr lang="en-US" dirty="0"/>
+              <a:t>Work great</a:t>
+            </a:r>
+          </a:p>
+          <a:p>
+            <a:r>
+              <a:rPr lang="en-US" dirty="0"/>
+              <a:t>Look great</a:t>
+            </a:r>
+          </a:p>
+          <a:p>
             <a:endParaRPr lang="en-US" dirty="0"/>
           </a:p>
-          <a:p>
-            <a:endParaRPr lang="en-US" dirty="0"/>
-          </a:p>
-          <a:p>
-            <a:endParaRPr lang="en-US" dirty="0"/>
-          </a:p>
-        </p:txBody>
-      </p:sp>
+        </p:txBody>
+      </p:sp>
+      <p:pic>
+        <p:nvPicPr>
+          <p:cNvPr id="2050" name="Picture 2" descr="http://puu.sh/nXxWv/88b0feedeb.png"/>
+          <p:cNvPicPr>
+            <a:picLocks noChangeAspect="1" noChangeArrowheads="1"/>
+          </p:cNvPicPr>
+          <p:nvPr/>
+        </p:nvPicPr>
+        <p:blipFill>
+          <a:blip r:embed="rId2">
+            <a:extLst>
+              <a:ext uri="{28A0092B-C50C-407E-A947-70E740481C1C}">
+                <a14:useLocalDpi xmlns:a14="http://schemas.microsoft.com/office/drawing/2010/main" val="0"/>
+              </a:ext>
+            </a:extLst>
+          </a:blip>
+          <a:srcRect/>
+          <a:stretch>
+            <a:fillRect/>
+          </a:stretch>
+        </p:blipFill>
+        <p:spPr bwMode="auto">
+          <a:xfrm>
+            <a:off x="11163301" y="-12700"/>
+            <a:ext cx="1041400" cy="8773998"/>
+          </a:xfrm>
+          <a:prstGeom prst="rect">
+            <a:avLst/>
+          </a:prstGeom>
+          <a:noFill/>
+          <a:extLst>
+            <a:ext uri="{909E8E84-426E-40DD-AFC4-6F175D3DCCD1}">
+              <a14:hiddenFill xmlns:a14="http://schemas.microsoft.com/office/drawing/2010/main">
+                <a:solidFill>
+                  <a:srgbClr val="FFFFFF"/>
+                </a:solidFill>
+              </a14:hiddenFill>
+            </a:ext>
+          </a:extLst>
+        </p:spPr>
+      </p:pic>
+      <p:pic>
+        <p:nvPicPr>
+          <p:cNvPr id="2052" name="Picture 4" descr="http://puu.sh/nXy09/54b3b37ca9.png"/>
+          <p:cNvPicPr>
+            <a:picLocks noChangeAspect="1" noChangeArrowheads="1"/>
+          </p:cNvPicPr>
+          <p:nvPr/>
+        </p:nvPicPr>
+        <p:blipFill>
+          <a:blip r:embed="rId3">
+            <a:extLst>
+              <a:ext uri="{28A0092B-C50C-407E-A947-70E740481C1C}">
+                <a14:useLocalDpi xmlns:a14="http://schemas.microsoft.com/office/drawing/2010/main" val="0"/>
+              </a:ext>
+            </a:extLst>
+          </a:blip>
+          <a:srcRect/>
+          <a:stretch>
+            <a:fillRect/>
+          </a:stretch>
+        </p:blipFill>
+        <p:spPr bwMode="auto">
+          <a:xfrm>
+            <a:off x="7898051" y="631478"/>
+            <a:ext cx="3265250" cy="1389468"/>
+          </a:xfrm>
+          <a:prstGeom prst="rect">
+            <a:avLst/>
+          </a:prstGeom>
+          <a:noFill/>
+          <a:extLst>
+            <a:ext uri="{909E8E84-426E-40DD-AFC4-6F175D3DCCD1}">
+              <a14:hiddenFill xmlns:a14="http://schemas.microsoft.com/office/drawing/2010/main">
+                <a:solidFill>
+                  <a:srgbClr val="FFFFFF"/>
+                </a:solidFill>
+              </a14:hiddenFill>
+            </a:ext>
+          </a:extLst>
+        </p:spPr>
+      </p:pic>
+      <p:pic>
+        <p:nvPicPr>
+          <p:cNvPr id="2054" name="Picture 6" descr="http://puu.sh/nXy25/8fb5d0af8d.png"/>
+          <p:cNvPicPr>
+            <a:picLocks noChangeAspect="1" noChangeArrowheads="1"/>
+          </p:cNvPicPr>
+          <p:nvPr/>
+        </p:nvPicPr>
+        <p:blipFill>
+          <a:blip r:embed="rId4">
+            <a:extLst>
+              <a:ext uri="{28A0092B-C50C-407E-A947-70E740481C1C}">
+                <a14:useLocalDpi xmlns:a14="http://schemas.microsoft.com/office/drawing/2010/main" val="0"/>
+              </a:ext>
+            </a:extLst>
+          </a:blip>
+          <a:srcRect/>
+          <a:stretch>
+            <a:fillRect/>
+          </a:stretch>
+        </p:blipFill>
+        <p:spPr bwMode="auto">
+          <a:xfrm>
+            <a:off x="6105890" y="2095957"/>
+            <a:ext cx="2605455" cy="1752141"/>
+          </a:xfrm>
+          <a:prstGeom prst="rect">
+            <a:avLst/>
+          </a:prstGeom>
+          <a:noFill/>
+          <a:extLst>
+            <a:ext uri="{909E8E84-426E-40DD-AFC4-6F175D3DCCD1}">
+              <a14:hiddenFill xmlns:a14="http://schemas.microsoft.com/office/drawing/2010/main">
+                <a:solidFill>
+                  <a:srgbClr val="FFFFFF"/>
+                </a:solidFill>
+              </a14:hiddenFill>
+            </a:ext>
+          </a:extLst>
+        </p:spPr>
+      </p:pic>
+      <p:pic>
+        <p:nvPicPr>
+          <p:cNvPr id="2056" name="Picture 8" descr="http://puu.sh/nXy3H/3d3d8e6b02.png"/>
+          <p:cNvPicPr>
+            <a:picLocks noChangeAspect="1" noChangeArrowheads="1"/>
+          </p:cNvPicPr>
+          <p:nvPr/>
+        </p:nvPicPr>
+        <p:blipFill>
+          <a:blip r:embed="rId5">
+            <a:extLst>
+              <a:ext uri="{28A0092B-C50C-407E-A947-70E740481C1C}">
+                <a14:useLocalDpi xmlns:a14="http://schemas.microsoft.com/office/drawing/2010/main" val="0"/>
+              </a:ext>
+            </a:extLst>
+          </a:blip>
+          <a:srcRect/>
+          <a:stretch>
+            <a:fillRect/>
+          </a:stretch>
+        </p:blipFill>
+        <p:spPr bwMode="auto">
+          <a:xfrm>
+            <a:off x="6093934" y="3848098"/>
+            <a:ext cx="2748195" cy="3024396"/>
+          </a:xfrm>
+          <a:prstGeom prst="rect">
+            <a:avLst/>
+          </a:prstGeom>
+          <a:noFill/>
+          <a:extLst>
+            <a:ext uri="{909E8E84-426E-40DD-AFC4-6F175D3DCCD1}">
+              <a14:hiddenFill xmlns:a14="http://schemas.microsoft.com/office/drawing/2010/main">
+                <a:solidFill>
+                  <a:srgbClr val="FFFFFF"/>
+                </a:solidFill>
+              </a14:hiddenFill>
+            </a:ext>
+          </a:extLst>
+        </p:spPr>
+      </p:pic>
+      <p:pic>
+        <p:nvPicPr>
+          <p:cNvPr id="2058" name="Picture 10" descr="http://puu.sh/nXy6R/72411a1cdf.png"/>
+          <p:cNvPicPr>
+            <a:picLocks noChangeAspect="1" noChangeArrowheads="1"/>
+          </p:cNvPicPr>
+          <p:nvPr/>
+        </p:nvPicPr>
+        <p:blipFill>
+          <a:blip r:embed="rId6">
+            <a:extLst>
+              <a:ext uri="{28A0092B-C50C-407E-A947-70E740481C1C}">
+                <a14:useLocalDpi xmlns:a14="http://schemas.microsoft.com/office/drawing/2010/main" val="0"/>
+              </a:ext>
+            </a:extLst>
+          </a:blip>
+          <a:srcRect/>
+          <a:stretch>
+            <a:fillRect/>
+          </a:stretch>
+        </p:blipFill>
+        <p:spPr bwMode="auto">
+          <a:xfrm>
+            <a:off x="8842129" y="4988169"/>
+            <a:ext cx="2330888" cy="1877310"/>
+          </a:xfrm>
+          <a:prstGeom prst="rect">
+            <a:avLst/>
+          </a:prstGeom>
+          <a:noFill/>
+          <a:extLst>
+            <a:ext uri="{909E8E84-426E-40DD-AFC4-6F175D3DCCD1}">
+              <a14:hiddenFill xmlns:a14="http://schemas.microsoft.com/office/drawing/2010/main">
+                <a:solidFill>
+                  <a:srgbClr val="FFFFFF"/>
+                </a:solidFill>
+              </a14:hiddenFill>
+            </a:ext>
+          </a:extLst>
+        </p:spPr>
+      </p:pic>
+      <p:pic>
+        <p:nvPicPr>
+          <p:cNvPr id="2060" name="Picture 12" descr="http://puu.sh/nXyac/e71c890cb8.png"/>
+          <p:cNvPicPr>
+            <a:picLocks noChangeAspect="1" noChangeArrowheads="1"/>
+          </p:cNvPicPr>
+          <p:nvPr/>
+        </p:nvPicPr>
+        <p:blipFill>
+          <a:blip r:embed="rId7">
+            <a:extLst>
+              <a:ext uri="{28A0092B-C50C-407E-A947-70E740481C1C}">
+                <a14:useLocalDpi xmlns:a14="http://schemas.microsoft.com/office/drawing/2010/main" val="0"/>
+              </a:ext>
+            </a:extLst>
+          </a:blip>
+          <a:srcRect/>
+          <a:stretch>
+            <a:fillRect/>
+          </a:stretch>
+        </p:blipFill>
+        <p:spPr bwMode="auto">
+          <a:xfrm>
+            <a:off x="10222346" y="2665124"/>
+            <a:ext cx="638175" cy="590551"/>
+          </a:xfrm>
+          <a:prstGeom prst="rect">
+            <a:avLst/>
+          </a:prstGeom>
+          <a:noFill/>
+          <a:extLst>
+            <a:ext uri="{909E8E84-426E-40DD-AFC4-6F175D3DCCD1}">
+              <a14:hiddenFill xmlns:a14="http://schemas.microsoft.com/office/drawing/2010/main">
+                <a:solidFill>
+                  <a:srgbClr val="FFFFFF"/>
+                </a:solidFill>
+              </a14:hiddenFill>
+            </a:ext>
+          </a:extLst>
+        </p:spPr>
+      </p:pic>
+      <p:pic>
+        <p:nvPicPr>
+          <p:cNvPr id="2062" name="Picture 14" descr="http://puu.sh/nXybS/f2e7784bd5.png"/>
+          <p:cNvPicPr>
+            <a:picLocks noChangeAspect="1" noChangeArrowheads="1"/>
+          </p:cNvPicPr>
+          <p:nvPr/>
+        </p:nvPicPr>
+        <p:blipFill>
+          <a:blip r:embed="rId8">
+            <a:extLst>
+              <a:ext uri="{28A0092B-C50C-407E-A947-70E740481C1C}">
+                <a14:useLocalDpi xmlns:a14="http://schemas.microsoft.com/office/drawing/2010/main" val="0"/>
+              </a:ext>
+            </a:extLst>
+          </a:blip>
+          <a:srcRect/>
+          <a:stretch>
+            <a:fillRect/>
+          </a:stretch>
+        </p:blipFill>
+        <p:spPr bwMode="auto">
+          <a:xfrm>
+            <a:off x="4063241" y="4805569"/>
+            <a:ext cx="2028825" cy="2066925"/>
+          </a:xfrm>
+          <a:prstGeom prst="rect">
+            <a:avLst/>
+          </a:prstGeom>
+          <a:noFill/>
+          <a:extLst>
+            <a:ext uri="{909E8E84-426E-40DD-AFC4-6F175D3DCCD1}">
+              <a14:hiddenFill xmlns:a14="http://schemas.microsoft.com/office/drawing/2010/main">
+                <a:solidFill>
+                  <a:srgbClr val="FFFFFF"/>
+                </a:solidFill>
+              </a14:hiddenFill>
+            </a:ext>
+          </a:extLst>
+        </p:spPr>
+      </p:pic>
+      <p:pic>
+        <p:nvPicPr>
+          <p:cNvPr id="2064" name="Picture 16" descr="http://puu.sh/nXydo/703f39ea70.png"/>
+          <p:cNvPicPr>
+            <a:picLocks noChangeAspect="1" noChangeArrowheads="1"/>
+          </p:cNvPicPr>
+          <p:nvPr/>
+        </p:nvPicPr>
+        <p:blipFill>
+          <a:blip r:embed="rId9">
+            <a:extLst>
+              <a:ext uri="{28A0092B-C50C-407E-A947-70E740481C1C}">
+                <a14:useLocalDpi xmlns:a14="http://schemas.microsoft.com/office/drawing/2010/main" val="0"/>
+              </a:ext>
+            </a:extLst>
+          </a:blip>
+          <a:srcRect/>
+          <a:stretch>
+            <a:fillRect/>
+          </a:stretch>
+        </p:blipFill>
+        <p:spPr bwMode="auto">
+          <a:xfrm>
+            <a:off x="4174192" y="2866857"/>
+            <a:ext cx="1931698" cy="1962482"/>
+          </a:xfrm>
+          <a:prstGeom prst="rect">
+            <a:avLst/>
+          </a:prstGeom>
+          <a:noFill/>
+          <a:extLst>
+            <a:ext uri="{909E8E84-426E-40DD-AFC4-6F175D3DCCD1}">
+              <a14:hiddenFill xmlns:a14="http://schemas.microsoft.com/office/drawing/2010/main">
+                <a:solidFill>
+                  <a:srgbClr val="FFFFFF"/>
+                </a:solidFill>
+              </a14:hiddenFill>
+            </a:ext>
+          </a:extLst>
+        </p:spPr>
+      </p:pic>
+      <p:pic>
+        <p:nvPicPr>
+          <p:cNvPr id="2066" name="Picture 18" descr="http://puu.sh/nXyfy/cd0415c8d6.png"/>
+          <p:cNvPicPr>
+            <a:picLocks noChangeAspect="1" noChangeArrowheads="1"/>
+          </p:cNvPicPr>
+          <p:nvPr/>
+        </p:nvPicPr>
+        <p:blipFill>
+          <a:blip r:embed="rId10">
+            <a:extLst>
+              <a:ext uri="{28A0092B-C50C-407E-A947-70E740481C1C}">
+                <a14:useLocalDpi xmlns:a14="http://schemas.microsoft.com/office/drawing/2010/main" val="0"/>
+              </a:ext>
+            </a:extLst>
+          </a:blip>
+          <a:srcRect/>
+          <a:stretch>
+            <a:fillRect/>
+          </a:stretch>
+        </p:blipFill>
+        <p:spPr bwMode="auto">
+          <a:xfrm>
+            <a:off x="-11686" y="4391025"/>
+            <a:ext cx="571500" cy="2466975"/>
+          </a:xfrm>
+          <a:prstGeom prst="rect">
+            <a:avLst/>
+          </a:prstGeom>
+          <a:noFill/>
+          <a:extLst>
+            <a:ext uri="{909E8E84-426E-40DD-AFC4-6F175D3DCCD1}">
+              <a14:hiddenFill xmlns:a14="http://schemas.microsoft.com/office/drawing/2010/main">
+                <a:solidFill>
+                  <a:srgbClr val="FFFFFF"/>
+                </a:solidFill>
+              </a14:hiddenFill>
+            </a:ext>
+          </a:extLst>
+        </p:spPr>
+      </p:pic>
+      <p:pic>
+        <p:nvPicPr>
+          <p:cNvPr id="2068" name="Picture 20" descr="http://puu.sh/nXyim/0b718fea75.png"/>
+          <p:cNvPicPr>
+            <a:picLocks noChangeAspect="1" noChangeArrowheads="1"/>
+          </p:cNvPicPr>
+          <p:nvPr/>
+        </p:nvPicPr>
+        <p:blipFill>
+          <a:blip r:embed="rId11">
+            <a:extLst>
+              <a:ext uri="{28A0092B-C50C-407E-A947-70E740481C1C}">
+                <a14:useLocalDpi xmlns:a14="http://schemas.microsoft.com/office/drawing/2010/main" val="0"/>
+              </a:ext>
+            </a:extLst>
+          </a:blip>
+          <a:srcRect/>
+          <a:stretch>
+            <a:fillRect/>
+          </a:stretch>
+        </p:blipFill>
+        <p:spPr bwMode="auto">
+          <a:xfrm>
+            <a:off x="9530676" y="3779269"/>
+            <a:ext cx="704850" cy="933450"/>
+          </a:xfrm>
+          <a:prstGeom prst="rect">
+            <a:avLst/>
+          </a:prstGeom>
+          <a:noFill/>
+          <a:extLst>
+            <a:ext uri="{909E8E84-426E-40DD-AFC4-6F175D3DCCD1}">
+              <a14:hiddenFill xmlns:a14="http://schemas.microsoft.com/office/drawing/2010/main">
+                <a:solidFill>
+                  <a:srgbClr val="FFFFFF"/>
+                </a:solidFill>
+              </a14:hiddenFill>
+            </a:ext>
+          </a:extLst>
+        </p:spPr>
+      </p:pic>
+      <p:pic>
+        <p:nvPicPr>
+          <p:cNvPr id="2070" name="Picture 22" descr="http://puu.sh/nXykw/ff1476cba8.png"/>
+          <p:cNvPicPr>
+            <a:picLocks noChangeAspect="1" noChangeArrowheads="1"/>
+          </p:cNvPicPr>
+          <p:nvPr/>
+        </p:nvPicPr>
+        <p:blipFill>
+          <a:blip r:embed="rId12">
+            <a:extLst>
+              <a:ext uri="{28A0092B-C50C-407E-A947-70E740481C1C}">
+                <a14:useLocalDpi xmlns:a14="http://schemas.microsoft.com/office/drawing/2010/main" val="0"/>
+              </a:ext>
+            </a:extLst>
+          </a:blip>
+          <a:srcRect/>
+          <a:stretch>
+            <a:fillRect/>
+          </a:stretch>
+        </p:blipFill>
+        <p:spPr bwMode="auto">
+          <a:xfrm>
+            <a:off x="8872756" y="2141744"/>
+            <a:ext cx="819150" cy="1362075"/>
+          </a:xfrm>
+          <a:prstGeom prst="rect">
+            <a:avLst/>
+          </a:prstGeom>
+          <a:noFill/>
+          <a:extLst>
+            <a:ext uri="{909E8E84-426E-40DD-AFC4-6F175D3DCCD1}">
+              <a14:hiddenFill xmlns:a14="http://schemas.microsoft.com/office/drawing/2010/main">
+                <a:solidFill>
+                  <a:srgbClr val="FFFFFF"/>
+                </a:solidFill>
+              </a14:hiddenFill>
+            </a:ext>
+          </a:extLst>
+        </p:spPr>
+      </p:pic>
+      <p:pic>
+        <p:nvPicPr>
+          <p:cNvPr id="2072" name="Picture 24" descr="http://puu.sh/nXz9F/93e359cea1.png"/>
+          <p:cNvPicPr>
+            <a:picLocks noChangeAspect="1" noChangeArrowheads="1"/>
+          </p:cNvPicPr>
+          <p:nvPr/>
+        </p:nvPicPr>
+        <p:blipFill>
+          <a:blip r:embed="rId13">
+            <a:extLst>
+              <a:ext uri="{28A0092B-C50C-407E-A947-70E740481C1C}">
+                <a14:useLocalDpi xmlns:a14="http://schemas.microsoft.com/office/drawing/2010/main" val="0"/>
+              </a:ext>
+            </a:extLst>
+          </a:blip>
+          <a:srcRect/>
+          <a:stretch>
+            <a:fillRect/>
+          </a:stretch>
+        </p:blipFill>
+        <p:spPr bwMode="auto">
+          <a:xfrm>
+            <a:off x="1248542" y="5210173"/>
+            <a:ext cx="2819400" cy="552451"/>
+          </a:xfrm>
+          <a:prstGeom prst="rect">
+            <a:avLst/>
+          </a:prstGeom>
+          <a:noFill/>
+          <a:extLst>
+            <a:ext uri="{909E8E84-426E-40DD-AFC4-6F175D3DCCD1}">
+              <a14:hiddenFill xmlns:a14="http://schemas.microsoft.com/office/drawing/2010/main">
+                <a:solidFill>
+                  <a:srgbClr val="FFFFFF"/>
+                </a:solidFill>
+              </a14:hiddenFill>
+            </a:ext>
+          </a:extLst>
+        </p:spPr>
+      </p:pic>
+      <p:pic>
+        <p:nvPicPr>
+          <p:cNvPr id="2074" name="Picture 26" descr="http://puu.sh/nXzg4/eb715991fb.png"/>
+          <p:cNvPicPr>
+            <a:picLocks noChangeAspect="1" noChangeArrowheads="1"/>
+          </p:cNvPicPr>
+          <p:nvPr/>
+        </p:nvPicPr>
+        <p:blipFill>
+          <a:blip r:embed="rId14">
+            <a:extLst>
+              <a:ext uri="{28A0092B-C50C-407E-A947-70E740481C1C}">
+                <a14:useLocalDpi xmlns:a14="http://schemas.microsoft.com/office/drawing/2010/main" val="0"/>
+              </a:ext>
+            </a:extLst>
+          </a:blip>
+          <a:srcRect/>
+          <a:stretch>
+            <a:fillRect/>
+          </a:stretch>
+        </p:blipFill>
+        <p:spPr bwMode="auto">
+          <a:xfrm>
+            <a:off x="559814" y="5762624"/>
+            <a:ext cx="2914650" cy="1095376"/>
+          </a:xfrm>
+          <a:prstGeom prst="rect">
+            <a:avLst/>
+          </a:prstGeom>
+          <a:noFill/>
+          <a:extLst>
+            <a:ext uri="{909E8E84-426E-40DD-AFC4-6F175D3DCCD1}">
+              <a14:hiddenFill xmlns:a14="http://schemas.microsoft.com/office/drawing/2010/main">
+                <a:solidFill>
+                  <a:srgbClr val="FFFFFF"/>
+                </a:solidFill>
+              </a14:hiddenFill>
+            </a:ext>
+          </a:extLst>
+        </p:spPr>
+      </p:pic>
     </p:spTree>
     <p:extLst>
       <p:ext uri="{BB962C8B-B14F-4D97-AF65-F5344CB8AC3E}">
-        <p14:creationId xmlns:p14="http://schemas.microsoft.com/office/powerpoint/2010/main" val="3561944362"/>
+        <p14:creationId xmlns:p14="http://schemas.microsoft.com/office/powerpoint/2010/main" val="647120739"/>
+      </p:ext>
+    </p:extLst>
+  </p:cSld>
+  <p:clrMapOvr>
+    <a:masterClrMapping/>
+  </p:clrMapOvr>
+  <mc:AlternateContent xmlns:mc="http://schemas.openxmlformats.org/markup-compatibility/2006" xmlns:p14="http://schemas.microsoft.com/office/powerpoint/2010/main">
+    <mc:Choice Requires="p14">
+      <p:transition spd="med" p14:dur="700">
+        <p:fade/>
+      </p:transition>
+    </mc:Choice>
+    <mc:Fallback xmlns="">
+      <p:transition spd="med">
+        <p:fade/>
+      </p:transition>
+    </mc:Fallback>
+  </mc:AlternateContent>
+</p:sld>
+</file>
+
+<file path=ppt/slides/slide9.xml><?xml version="1.0" encoding="utf-8"?>
+<p:sld xmlns:a="http://schemas.openxmlformats.org/drawingml/2006/main" xmlns:r="http://schemas.openxmlformats.org/officeDocument/2006/relationships" xmlns:p="http://schemas.openxmlformats.org/presentationml/2006/main">
+  <p:cSld>
+    <p:spTree>
+      <p:nvGrpSpPr>
+        <p:cNvPr id="1" name=""/>
+        <p:cNvGrpSpPr/>
+        <p:nvPr/>
+      </p:nvGrpSpPr>
+      <p:grpSpPr>
+        <a:xfrm>
+          <a:off x="0" y="0"/>
+          <a:ext cx="0" cy="0"/>
+          <a:chOff x="0" y="0"/>
+          <a:chExt cx="0" cy="0"/>
+        </a:xfrm>
+      </p:grpSpPr>
+      <p:pic>
+        <p:nvPicPr>
+          <p:cNvPr id="4" name="Picture 2" descr="http://puu.sh/nXpl5/48ee1af809.png"/>
+          <p:cNvPicPr>
+            <a:picLocks noChangeAspect="1" noChangeArrowheads="1"/>
+          </p:cNvPicPr>
+          <p:nvPr/>
+        </p:nvPicPr>
+        <p:blipFill>
+          <a:blip r:embed="rId2">
+            <a:extLst>
+              <a:ext uri="{28A0092B-C50C-407E-A947-70E740481C1C}">
+                <a14:useLocalDpi xmlns:a14="http://schemas.microsoft.com/office/drawing/2010/main" val="0"/>
+              </a:ext>
+            </a:extLst>
+          </a:blip>
+          <a:srcRect/>
+          <a:stretch>
+            <a:fillRect/>
+          </a:stretch>
+        </p:blipFill>
+        <p:spPr bwMode="auto">
+          <a:xfrm>
+            <a:off x="0" y="0"/>
+            <a:ext cx="5370311" cy="5125533"/>
+          </a:xfrm>
+          <a:prstGeom prst="rect">
+            <a:avLst/>
+          </a:prstGeom>
+          <a:noFill/>
+          <a:extLst>
+            <a:ext uri="{909E8E84-426E-40DD-AFC4-6F175D3DCCD1}">
+              <a14:hiddenFill xmlns:a14="http://schemas.microsoft.com/office/drawing/2010/main">
+                <a:solidFill>
+                  <a:srgbClr val="FFFFFF"/>
+                </a:solidFill>
+              </a14:hiddenFill>
+            </a:ext>
+          </a:extLst>
+        </p:spPr>
+      </p:pic>
+      <p:pic>
+        <p:nvPicPr>
+          <p:cNvPr id="5" name="Picture 6" descr="http://puu.sh/nXy25/8fb5d0af8d.png"/>
+          <p:cNvPicPr>
+            <a:picLocks noChangeAspect="1" noChangeArrowheads="1"/>
+          </p:cNvPicPr>
+          <p:nvPr/>
+        </p:nvPicPr>
+        <p:blipFill>
+          <a:blip r:embed="rId3">
+            <a:extLst>
+              <a:ext uri="{28A0092B-C50C-407E-A947-70E740481C1C}">
+                <a14:useLocalDpi xmlns:a14="http://schemas.microsoft.com/office/drawing/2010/main" val="0"/>
+              </a:ext>
+            </a:extLst>
+          </a:blip>
+          <a:srcRect/>
+          <a:stretch>
+            <a:fillRect/>
+          </a:stretch>
+        </p:blipFill>
+        <p:spPr bwMode="auto">
+          <a:xfrm>
+            <a:off x="7624026" y="0"/>
+            <a:ext cx="2605455" cy="1752141"/>
+          </a:xfrm>
+          <a:prstGeom prst="rect">
+            <a:avLst/>
+          </a:prstGeom>
+          <a:noFill/>
+          <a:extLst>
+            <a:ext uri="{909E8E84-426E-40DD-AFC4-6F175D3DCCD1}">
+              <a14:hiddenFill xmlns:a14="http://schemas.microsoft.com/office/drawing/2010/main">
+                <a:solidFill>
+                  <a:srgbClr val="FFFFFF"/>
+                </a:solidFill>
+              </a14:hiddenFill>
+            </a:ext>
+          </a:extLst>
+        </p:spPr>
+      </p:pic>
+      <p:pic>
+        <p:nvPicPr>
+          <p:cNvPr id="6" name="Picture 4" descr="http://puu.sh/nXy09/54b3b37ca9.png"/>
+          <p:cNvPicPr>
+            <a:picLocks noChangeAspect="1" noChangeArrowheads="1"/>
+          </p:cNvPicPr>
+          <p:nvPr/>
+        </p:nvPicPr>
+        <p:blipFill>
+          <a:blip r:embed="rId4">
+            <a:extLst>
+              <a:ext uri="{28A0092B-C50C-407E-A947-70E740481C1C}">
+                <a14:useLocalDpi xmlns:a14="http://schemas.microsoft.com/office/drawing/2010/main" val="0"/>
+              </a:ext>
+            </a:extLst>
+          </a:blip>
+          <a:srcRect/>
+          <a:stretch>
+            <a:fillRect/>
+          </a:stretch>
+        </p:blipFill>
+        <p:spPr bwMode="auto">
+          <a:xfrm>
+            <a:off x="7624026" y="2067555"/>
+            <a:ext cx="3265250" cy="1389468"/>
+          </a:xfrm>
+          <a:prstGeom prst="rect">
+            <a:avLst/>
+          </a:prstGeom>
+          <a:noFill/>
+          <a:extLst>
+            <a:ext uri="{909E8E84-426E-40DD-AFC4-6F175D3DCCD1}">
+              <a14:hiddenFill xmlns:a14="http://schemas.microsoft.com/office/drawing/2010/main">
+                <a:solidFill>
+                  <a:srgbClr val="FFFFFF"/>
+                </a:solidFill>
+              </a14:hiddenFill>
+            </a:ext>
+          </a:extLst>
+        </p:spPr>
+      </p:pic>
+      <p:sp>
+        <p:nvSpPr>
+          <p:cNvPr id="7" name="Rectangle 6"/>
+          <p:cNvSpPr/>
+          <p:nvPr/>
+        </p:nvSpPr>
+        <p:spPr>
+          <a:xfrm>
+            <a:off x="7508628" y="723442"/>
+            <a:ext cx="2889738" cy="463062"/>
+          </a:xfrm>
+          <a:prstGeom prst="rect">
+            <a:avLst/>
+          </a:prstGeom>
+          <a:noFill/>
+          <a:ln w="57150">
+            <a:solidFill>
+              <a:schemeClr val="accent1"/>
+            </a:solidFill>
+          </a:ln>
+        </p:spPr>
+        <p:style>
+          <a:lnRef idx="2">
+            <a:schemeClr val="accent1">
+              <a:shade val="50000"/>
+            </a:schemeClr>
+          </a:lnRef>
+          <a:fillRef idx="1">
+            <a:schemeClr val="accent1"/>
+          </a:fillRef>
+          <a:effectRef idx="0">
+            <a:schemeClr val="accent1"/>
+          </a:effectRef>
+          <a:fontRef idx="minor">
+            <a:schemeClr val="lt1"/>
+          </a:fontRef>
+        </p:style>
+        <p:txBody>
+          <a:bodyPr rtlCol="0" anchor="ctr"/>
+          <a:lstStyle/>
+          <a:p>
+            <a:pPr algn="ctr"/>
+            <a:endParaRPr lang="en-US"/>
+          </a:p>
+        </p:txBody>
+      </p:sp>
+      <p:cxnSp>
+        <p:nvCxnSpPr>
+          <p:cNvPr id="9" name="Straight Arrow Connector 8"/>
+          <p:cNvCxnSpPr>
+            <a:stCxn id="7" idx="1"/>
+            <a:endCxn id="14" idx="3"/>
+          </p:cNvCxnSpPr>
+          <p:nvPr/>
+        </p:nvCxnSpPr>
+        <p:spPr>
+          <a:xfrm flipH="1" flipV="1">
+            <a:off x="5105400" y="597877"/>
+            <a:ext cx="2403228" cy="357096"/>
+          </a:xfrm>
+          <a:prstGeom prst="straightConnector1">
+            <a:avLst/>
+          </a:prstGeom>
+          <a:ln w="38100">
+            <a:tailEnd type="triangle"/>
+          </a:ln>
+        </p:spPr>
+        <p:style>
+          <a:lnRef idx="1">
+            <a:schemeClr val="accent1"/>
+          </a:lnRef>
+          <a:fillRef idx="0">
+            <a:schemeClr val="accent1"/>
+          </a:fillRef>
+          <a:effectRef idx="0">
+            <a:schemeClr val="accent1"/>
+          </a:effectRef>
+          <a:fontRef idx="minor">
+            <a:schemeClr val="tx1"/>
+          </a:fontRef>
+        </p:style>
+      </p:cxnSp>
+      <p:sp>
+        <p:nvSpPr>
+          <p:cNvPr id="10" name="Rectangle 9"/>
+          <p:cNvSpPr/>
+          <p:nvPr/>
+        </p:nvSpPr>
+        <p:spPr>
+          <a:xfrm>
+            <a:off x="8417348" y="2112627"/>
+            <a:ext cx="943707" cy="463062"/>
+          </a:xfrm>
+          <a:prstGeom prst="rect">
+            <a:avLst/>
+          </a:prstGeom>
+          <a:noFill/>
+          <a:ln w="57150">
+            <a:solidFill>
+              <a:schemeClr val="accent1"/>
+            </a:solidFill>
+          </a:ln>
+        </p:spPr>
+        <p:style>
+          <a:lnRef idx="2">
+            <a:schemeClr val="accent1">
+              <a:shade val="50000"/>
+            </a:schemeClr>
+          </a:lnRef>
+          <a:fillRef idx="1">
+            <a:schemeClr val="accent1"/>
+          </a:fillRef>
+          <a:effectRef idx="0">
+            <a:schemeClr val="accent1"/>
+          </a:effectRef>
+          <a:fontRef idx="minor">
+            <a:schemeClr val="lt1"/>
+          </a:fontRef>
+        </p:style>
+        <p:txBody>
+          <a:bodyPr rtlCol="0" anchor="ctr"/>
+          <a:lstStyle/>
+          <a:p>
+            <a:pPr algn="ctr"/>
+            <a:endParaRPr lang="en-US"/>
+          </a:p>
+        </p:txBody>
+      </p:sp>
+      <p:cxnSp>
+        <p:nvCxnSpPr>
+          <p:cNvPr id="11" name="Straight Arrow Connector 10"/>
+          <p:cNvCxnSpPr>
+            <a:stCxn id="10" idx="1"/>
+            <a:endCxn id="15" idx="3"/>
+          </p:cNvCxnSpPr>
+          <p:nvPr/>
+        </p:nvCxnSpPr>
+        <p:spPr>
+          <a:xfrm flipH="1" flipV="1">
+            <a:off x="5081951" y="1174334"/>
+            <a:ext cx="3335397" cy="1169824"/>
+          </a:xfrm>
+          <a:prstGeom prst="straightConnector1">
+            <a:avLst/>
+          </a:prstGeom>
+          <a:ln w="38100">
+            <a:tailEnd type="triangle"/>
+          </a:ln>
+        </p:spPr>
+        <p:style>
+          <a:lnRef idx="1">
+            <a:schemeClr val="accent1"/>
+          </a:lnRef>
+          <a:fillRef idx="0">
+            <a:schemeClr val="accent1"/>
+          </a:fillRef>
+          <a:effectRef idx="0">
+            <a:schemeClr val="accent1"/>
+          </a:effectRef>
+          <a:fontRef idx="minor">
+            <a:schemeClr val="tx1"/>
+          </a:fontRef>
+        </p:style>
+      </p:cxnSp>
+      <p:sp>
+        <p:nvSpPr>
+          <p:cNvPr id="14" name="Rectangle 13"/>
+          <p:cNvSpPr/>
+          <p:nvPr/>
+        </p:nvSpPr>
+        <p:spPr>
+          <a:xfrm>
+            <a:off x="252046" y="263769"/>
+            <a:ext cx="4853354" cy="668216"/>
+          </a:xfrm>
+          <a:prstGeom prst="rect">
+            <a:avLst/>
+          </a:prstGeom>
+          <a:noFill/>
+          <a:ln w="28575">
+            <a:solidFill>
+              <a:schemeClr val="accent1"/>
+            </a:solidFill>
+            <a:prstDash val="sysDash"/>
+          </a:ln>
+        </p:spPr>
+        <p:style>
+          <a:lnRef idx="2">
+            <a:schemeClr val="accent1">
+              <a:shade val="50000"/>
+            </a:schemeClr>
+          </a:lnRef>
+          <a:fillRef idx="1">
+            <a:schemeClr val="accent1"/>
+          </a:fillRef>
+          <a:effectRef idx="0">
+            <a:schemeClr val="accent1"/>
+          </a:effectRef>
+          <a:fontRef idx="minor">
+            <a:schemeClr val="lt1"/>
+          </a:fontRef>
+        </p:style>
+        <p:txBody>
+          <a:bodyPr rtlCol="0" anchor="ctr"/>
+          <a:lstStyle/>
+          <a:p>
+            <a:pPr algn="ctr"/>
+            <a:endParaRPr lang="en-US"/>
+          </a:p>
+        </p:txBody>
+      </p:sp>
+      <p:sp>
+        <p:nvSpPr>
+          <p:cNvPr id="15" name="Rectangle 14"/>
+          <p:cNvSpPr/>
+          <p:nvPr/>
+        </p:nvSpPr>
+        <p:spPr>
+          <a:xfrm>
+            <a:off x="4213301" y="982931"/>
+            <a:ext cx="868650" cy="382806"/>
+          </a:xfrm>
+          <a:prstGeom prst="rect">
+            <a:avLst/>
+          </a:prstGeom>
+          <a:noFill/>
+          <a:ln w="28575">
+            <a:solidFill>
+              <a:schemeClr val="accent1"/>
+            </a:solidFill>
+            <a:prstDash val="sysDash"/>
+          </a:ln>
+        </p:spPr>
+        <p:style>
+          <a:lnRef idx="2">
+            <a:schemeClr val="accent1">
+              <a:shade val="50000"/>
+            </a:schemeClr>
+          </a:lnRef>
+          <a:fillRef idx="1">
+            <a:schemeClr val="accent1"/>
+          </a:fillRef>
+          <a:effectRef idx="0">
+            <a:schemeClr val="accent1"/>
+          </a:effectRef>
+          <a:fontRef idx="minor">
+            <a:schemeClr val="lt1"/>
+          </a:fontRef>
+        </p:style>
+        <p:txBody>
+          <a:bodyPr rtlCol="0" anchor="ctr"/>
+          <a:lstStyle/>
+          <a:p>
+            <a:pPr algn="ctr"/>
+            <a:endParaRPr lang="en-US"/>
+          </a:p>
+        </p:txBody>
+      </p:sp>
+      <p:sp>
+        <p:nvSpPr>
+          <p:cNvPr id="17" name="Rectangle 16"/>
+          <p:cNvSpPr/>
+          <p:nvPr/>
+        </p:nvSpPr>
+        <p:spPr>
+          <a:xfrm>
+            <a:off x="344685" y="2597934"/>
+            <a:ext cx="3868616" cy="579019"/>
+          </a:xfrm>
+          <a:prstGeom prst="rect">
+            <a:avLst/>
+          </a:prstGeom>
+          <a:noFill/>
+          <a:ln w="28575">
+            <a:solidFill>
+              <a:schemeClr val="accent1"/>
+            </a:solidFill>
+            <a:prstDash val="sysDash"/>
+          </a:ln>
+        </p:spPr>
+        <p:style>
+          <a:lnRef idx="2">
+            <a:schemeClr val="accent1">
+              <a:shade val="50000"/>
+            </a:schemeClr>
+          </a:lnRef>
+          <a:fillRef idx="1">
+            <a:schemeClr val="accent1"/>
+          </a:fillRef>
+          <a:effectRef idx="0">
+            <a:schemeClr val="accent1"/>
+          </a:effectRef>
+          <a:fontRef idx="minor">
+            <a:schemeClr val="lt1"/>
+          </a:fontRef>
+        </p:style>
+        <p:txBody>
+          <a:bodyPr rtlCol="0" anchor="ctr"/>
+          <a:lstStyle/>
+          <a:p>
+            <a:pPr algn="ctr"/>
+            <a:endParaRPr lang="en-US"/>
+          </a:p>
+        </p:txBody>
+      </p:sp>
+      <p:cxnSp>
+        <p:nvCxnSpPr>
+          <p:cNvPr id="21" name="Straight Arrow Connector 20"/>
+          <p:cNvCxnSpPr/>
+          <p:nvPr/>
+        </p:nvCxnSpPr>
+        <p:spPr>
+          <a:xfrm flipH="1" flipV="1">
+            <a:off x="4213302" y="2887444"/>
+            <a:ext cx="3600129" cy="1623507"/>
+          </a:xfrm>
+          <a:prstGeom prst="straightConnector1">
+            <a:avLst/>
+          </a:prstGeom>
+          <a:ln w="38100">
+            <a:tailEnd type="triangle"/>
+          </a:ln>
+        </p:spPr>
+        <p:style>
+          <a:lnRef idx="1">
+            <a:schemeClr val="accent1"/>
+          </a:lnRef>
+          <a:fillRef idx="0">
+            <a:schemeClr val="accent1"/>
+          </a:fillRef>
+          <a:effectRef idx="0">
+            <a:schemeClr val="accent1"/>
+          </a:effectRef>
+          <a:fontRef idx="minor">
+            <a:schemeClr val="tx1"/>
+          </a:fontRef>
+        </p:style>
+      </p:cxnSp>
+      <p:sp>
+        <p:nvSpPr>
+          <p:cNvPr id="24" name="Rectangle 23"/>
+          <p:cNvSpPr/>
+          <p:nvPr/>
+        </p:nvSpPr>
+        <p:spPr>
+          <a:xfrm>
+            <a:off x="248543" y="3903785"/>
+            <a:ext cx="4117158" cy="164123"/>
+          </a:xfrm>
+          <a:prstGeom prst="rect">
+            <a:avLst/>
+          </a:prstGeom>
+          <a:noFill/>
+          <a:ln w="28575">
+            <a:solidFill>
+              <a:schemeClr val="accent1"/>
+            </a:solidFill>
+            <a:prstDash val="sysDash"/>
+          </a:ln>
+        </p:spPr>
+        <p:style>
+          <a:lnRef idx="2">
+            <a:schemeClr val="accent1">
+              <a:shade val="50000"/>
+            </a:schemeClr>
+          </a:lnRef>
+          <a:fillRef idx="1">
+            <a:schemeClr val="accent1"/>
+          </a:fillRef>
+          <a:effectRef idx="0">
+            <a:schemeClr val="accent1"/>
+          </a:effectRef>
+          <a:fontRef idx="minor">
+            <a:schemeClr val="lt1"/>
+          </a:fontRef>
+        </p:style>
+        <p:txBody>
+          <a:bodyPr rtlCol="0" anchor="ctr"/>
+          <a:lstStyle/>
+          <a:p>
+            <a:pPr algn="ctr"/>
+            <a:endParaRPr lang="en-US"/>
+          </a:p>
+        </p:txBody>
+      </p:sp>
+      <p:cxnSp>
+        <p:nvCxnSpPr>
+          <p:cNvPr id="25" name="Straight Arrow Connector 24"/>
+          <p:cNvCxnSpPr>
+            <a:endCxn id="24" idx="3"/>
+          </p:cNvCxnSpPr>
+          <p:nvPr/>
+        </p:nvCxnSpPr>
+        <p:spPr>
+          <a:xfrm flipH="1" flipV="1">
+            <a:off x="4365701" y="3985847"/>
+            <a:ext cx="2439545" cy="1863128"/>
+          </a:xfrm>
+          <a:prstGeom prst="straightConnector1">
+            <a:avLst/>
+          </a:prstGeom>
+          <a:ln w="38100">
+            <a:tailEnd type="triangle"/>
+          </a:ln>
+        </p:spPr>
+        <p:style>
+          <a:lnRef idx="1">
+            <a:schemeClr val="accent1"/>
+          </a:lnRef>
+          <a:fillRef idx="0">
+            <a:schemeClr val="accent1"/>
+          </a:fillRef>
+          <a:effectRef idx="0">
+            <a:schemeClr val="accent1"/>
+          </a:effectRef>
+          <a:fontRef idx="minor">
+            <a:schemeClr val="tx1"/>
+          </a:fontRef>
+        </p:style>
+      </p:cxnSp>
+      <p:sp>
+        <p:nvSpPr>
+          <p:cNvPr id="29" name="TextBox 28"/>
+          <p:cNvSpPr txBox="1"/>
+          <p:nvPr/>
+        </p:nvSpPr>
+        <p:spPr>
+          <a:xfrm>
+            <a:off x="8102168" y="4516338"/>
+            <a:ext cx="2875852" cy="369332"/>
+          </a:xfrm>
+          <a:prstGeom prst="rect">
+            <a:avLst/>
+          </a:prstGeom>
+          <a:noFill/>
+        </p:spPr>
+        <p:txBody>
+          <a:bodyPr wrap="none" rtlCol="0">
+            <a:spAutoFit/>
+          </a:bodyPr>
+          <a:lstStyle/>
+          <a:p>
+            <a:r>
+              <a:rPr lang="en-US" dirty="0"/>
+              <a:t>This thing. For each message</a:t>
+            </a:r>
+          </a:p>
+        </p:txBody>
+      </p:sp>
+      <p:sp>
+        <p:nvSpPr>
+          <p:cNvPr id="30" name="TextBox 29"/>
+          <p:cNvSpPr txBox="1"/>
+          <p:nvPr/>
+        </p:nvSpPr>
+        <p:spPr>
+          <a:xfrm>
+            <a:off x="6931386" y="5848975"/>
+            <a:ext cx="3898440" cy="369332"/>
+          </a:xfrm>
+          <a:prstGeom prst="rect">
+            <a:avLst/>
+          </a:prstGeom>
+          <a:noFill/>
+        </p:spPr>
+        <p:txBody>
+          <a:bodyPr wrap="none" rtlCol="0">
+            <a:spAutoFit/>
+          </a:bodyPr>
+          <a:lstStyle/>
+          <a:p>
+            <a:r>
+              <a:rPr lang="en-US" dirty="0"/>
+              <a:t>And this thing… Between each message</a:t>
+            </a:r>
+          </a:p>
+        </p:txBody>
+      </p:sp>
+    </p:spTree>
+    <p:extLst>
+      <p:ext uri="{BB962C8B-B14F-4D97-AF65-F5344CB8AC3E}">
+        <p14:creationId xmlns:p14="http://schemas.microsoft.com/office/powerpoint/2010/main" val="980032565"/>
       </p:ext>
     </p:extLst>
   </p:cSld>

</xml_diff>

<commit_message>
added more to presentation, styles, and snippets
</commit_message>
<xml_diff>
--- a/workshop3/presentation.pptx
+++ b/workshop3/presentation.pptx
@@ -5,10 +5,10 @@
     <p:sldMasterId id="2147483648" r:id="rId2"/>
   </p:sldMasterIdLst>
   <p:notesMasterIdLst>
-    <p:notesMasterId r:id="rId14"/>
+    <p:notesMasterId r:id="rId17"/>
   </p:notesMasterIdLst>
   <p:handoutMasterIdLst>
-    <p:handoutMasterId r:id="rId15"/>
+    <p:handoutMasterId r:id="rId18"/>
   </p:handoutMasterIdLst>
   <p:sldIdLst>
     <p:sldId id="256" r:id="rId3"/>
@@ -20,8 +20,11 @@
     <p:sldId id="285" r:id="rId9"/>
     <p:sldId id="286" r:id="rId10"/>
     <p:sldId id="287" r:id="rId11"/>
-    <p:sldId id="282" r:id="rId12"/>
-    <p:sldId id="284" r:id="rId13"/>
+    <p:sldId id="288" r:id="rId12"/>
+    <p:sldId id="282" r:id="rId13"/>
+    <p:sldId id="290" r:id="rId14"/>
+    <p:sldId id="291" r:id="rId15"/>
+    <p:sldId id="284" r:id="rId16"/>
   </p:sldIdLst>
   <p:sldSz cx="12192000" cy="6858000"/>
   <p:notesSz cx="6858000" cy="9144000"/>
@@ -224,7 +227,7 @@
           <a:p>
             <a:fld id="{20EA5F0D-C1DC-412F-A146-DDB3A74B588F}" type="datetimeFigureOut">
               <a:rPr lang="en-US"/>
-              <a:t>3/28/2016</a:t>
+              <a:t>3/29/2016</a:t>
             </a:fld>
             <a:endParaRPr/>
           </a:p>
@@ -389,7 +392,7 @@
           <a:p>
             <a:fld id="{A8CDE508-72C8-4AB5-AA9C-1584D31690E0}" type="datetimeFigureOut">
               <a:rPr lang="en-US"/>
-              <a:t>3/28/2016</a:t>
+              <a:t>3/29/2016</a:t>
             </a:fld>
             <a:endParaRPr/>
           </a:p>
@@ -999,7 +1002,7 @@
           <a:p>
             <a:fld id="{9E583DDF-CA54-461A-A486-592D2374C532}" type="datetimeFigureOut">
               <a:rPr lang="en-US"/>
-              <a:t>3/28/2016</a:t>
+              <a:t>3/29/2016</a:t>
             </a:fld>
             <a:endParaRPr/>
           </a:p>
@@ -1191,7 +1194,7 @@
           <a:p>
             <a:fld id="{9E583DDF-CA54-461A-A486-592D2374C532}" type="datetimeFigureOut">
               <a:rPr lang="en-US"/>
-              <a:t>3/28/2016</a:t>
+              <a:t>3/29/2016</a:t>
             </a:fld>
             <a:endParaRPr/>
           </a:p>
@@ -1373,7 +1376,7 @@
           <a:p>
             <a:fld id="{9E583DDF-CA54-461A-A486-592D2374C532}" type="datetimeFigureOut">
               <a:rPr lang="en-US"/>
-              <a:t>3/28/2016</a:t>
+              <a:t>3/29/2016</a:t>
             </a:fld>
             <a:endParaRPr/>
           </a:p>
@@ -1679,7 +1682,7 @@
           <a:p>
             <a:fld id="{9E583DDF-CA54-461A-A486-592D2374C532}" type="datetimeFigureOut">
               <a:rPr lang="en-US"/>
-              <a:t>3/28/2016</a:t>
+              <a:t>3/29/2016</a:t>
             </a:fld>
             <a:endParaRPr/>
           </a:p>
@@ -1983,7 +1986,7 @@
           <a:p>
             <a:fld id="{0A879FD0-C37A-4F50-8F3B-5FA0D9D0B42F}" type="datetimeFigureOut">
               <a:rPr lang="en-US"/>
-              <a:t>3/28/2016</a:t>
+              <a:t>3/29/2016</a:t>
             </a:fld>
             <a:endParaRPr/>
           </a:p>
@@ -2427,7 +2430,7 @@
           <a:p>
             <a:fld id="{9E583DDF-CA54-461A-A486-592D2374C532}" type="datetimeFigureOut">
               <a:rPr lang="en-US"/>
-              <a:t>3/28/2016</a:t>
+              <a:t>3/29/2016</a:t>
             </a:fld>
             <a:endParaRPr/>
           </a:p>
@@ -2557,7 +2560,7 @@
           <a:p>
             <a:fld id="{9E583DDF-CA54-461A-A486-592D2374C532}" type="datetimeFigureOut">
               <a:rPr lang="en-US"/>
-              <a:t>3/28/2016</a:t>
+              <a:t>3/29/2016</a:t>
             </a:fld>
             <a:endParaRPr/>
           </a:p>
@@ -2709,7 +2712,7 @@
           <a:p>
             <a:fld id="{9E583DDF-CA54-461A-A486-592D2374C532}" type="datetimeFigureOut">
               <a:rPr lang="en-US"/>
-              <a:t>3/28/2016</a:t>
+              <a:t>3/29/2016</a:t>
             </a:fld>
             <a:endParaRPr/>
           </a:p>
@@ -3007,7 +3010,7 @@
           <a:p>
             <a:fld id="{9E583DDF-CA54-461A-A486-592D2374C532}" type="datetimeFigureOut">
               <a:rPr lang="en-US"/>
-              <a:t>3/28/2016</a:t>
+              <a:t>3/29/2016</a:t>
             </a:fld>
             <a:endParaRPr/>
           </a:p>
@@ -3293,7 +3296,7 @@
           <a:p>
             <a:fld id="{9E583DDF-CA54-461A-A486-592D2374C532}" type="datetimeFigureOut">
               <a:rPr lang="en-US"/>
-              <a:t>3/28/2016</a:t>
+              <a:t>3/29/2016</a:t>
             </a:fld>
             <a:endParaRPr/>
           </a:p>
@@ -3564,7 +3567,7 @@
             <a:fld id="{9E583DDF-CA54-461A-A486-592D2374C532}" type="datetimeFigureOut">
               <a:rPr lang="en-US"/>
               <a:pPr/>
-              <a:t>3/28/2016</a:t>
+              <a:t>3/29/2016</a:t>
             </a:fld>
             <a:endParaRPr/>
           </a:p>
@@ -4108,6 +4111,676 @@
           <a:chExt cx="0" cy="0"/>
         </a:xfrm>
       </p:grpSpPr>
+      <p:pic>
+        <p:nvPicPr>
+          <p:cNvPr id="4" name="Picture 2" descr="http://puu.sh/nXpl5/48ee1af809.png"/>
+          <p:cNvPicPr>
+            <a:picLocks noChangeAspect="1" noChangeArrowheads="1"/>
+          </p:cNvPicPr>
+          <p:nvPr/>
+        </p:nvPicPr>
+        <p:blipFill>
+          <a:blip r:embed="rId2">
+            <a:extLst>
+              <a:ext uri="{28A0092B-C50C-407E-A947-70E740481C1C}">
+                <a14:useLocalDpi xmlns:a14="http://schemas.microsoft.com/office/drawing/2010/main" val="0"/>
+              </a:ext>
+            </a:extLst>
+          </a:blip>
+          <a:srcRect/>
+          <a:stretch>
+            <a:fillRect/>
+          </a:stretch>
+        </p:blipFill>
+        <p:spPr bwMode="auto">
+          <a:xfrm>
+            <a:off x="0" y="0"/>
+            <a:ext cx="5370311" cy="5125533"/>
+          </a:xfrm>
+          <a:prstGeom prst="rect">
+            <a:avLst/>
+          </a:prstGeom>
+          <a:noFill/>
+          <a:extLst>
+            <a:ext uri="{909E8E84-426E-40DD-AFC4-6F175D3DCCD1}">
+              <a14:hiddenFill xmlns:a14="http://schemas.microsoft.com/office/drawing/2010/main">
+                <a:solidFill>
+                  <a:srgbClr val="FFFFFF"/>
+                </a:solidFill>
+              </a14:hiddenFill>
+            </a:ext>
+          </a:extLst>
+        </p:spPr>
+      </p:pic>
+      <p:sp>
+        <p:nvSpPr>
+          <p:cNvPr id="14" name="Rectangle 13"/>
+          <p:cNvSpPr/>
+          <p:nvPr/>
+        </p:nvSpPr>
+        <p:spPr>
+          <a:xfrm>
+            <a:off x="252046" y="263769"/>
+            <a:ext cx="4853354" cy="668216"/>
+          </a:xfrm>
+          <a:prstGeom prst="rect">
+            <a:avLst/>
+          </a:prstGeom>
+          <a:noFill/>
+          <a:ln w="28575">
+            <a:solidFill>
+              <a:schemeClr val="accent1"/>
+            </a:solidFill>
+            <a:prstDash val="sysDash"/>
+          </a:ln>
+        </p:spPr>
+        <p:style>
+          <a:lnRef idx="2">
+            <a:schemeClr val="accent1">
+              <a:shade val="50000"/>
+            </a:schemeClr>
+          </a:lnRef>
+          <a:fillRef idx="1">
+            <a:schemeClr val="accent1"/>
+          </a:fillRef>
+          <a:effectRef idx="0">
+            <a:schemeClr val="accent1"/>
+          </a:effectRef>
+          <a:fontRef idx="minor">
+            <a:schemeClr val="lt1"/>
+          </a:fontRef>
+        </p:style>
+        <p:txBody>
+          <a:bodyPr rtlCol="0" anchor="ctr"/>
+          <a:lstStyle/>
+          <a:p>
+            <a:pPr algn="ctr"/>
+            <a:endParaRPr lang="en-US"/>
+          </a:p>
+        </p:txBody>
+      </p:sp>
+      <p:sp>
+        <p:nvSpPr>
+          <p:cNvPr id="15" name="Rectangle 14"/>
+          <p:cNvSpPr/>
+          <p:nvPr/>
+        </p:nvSpPr>
+        <p:spPr>
+          <a:xfrm>
+            <a:off x="4213301" y="982931"/>
+            <a:ext cx="868650" cy="382806"/>
+          </a:xfrm>
+          <a:prstGeom prst="rect">
+            <a:avLst/>
+          </a:prstGeom>
+          <a:noFill/>
+          <a:ln w="28575">
+            <a:solidFill>
+              <a:schemeClr val="accent1"/>
+            </a:solidFill>
+            <a:prstDash val="sysDash"/>
+          </a:ln>
+        </p:spPr>
+        <p:style>
+          <a:lnRef idx="2">
+            <a:schemeClr val="accent1">
+              <a:shade val="50000"/>
+            </a:schemeClr>
+          </a:lnRef>
+          <a:fillRef idx="1">
+            <a:schemeClr val="accent1"/>
+          </a:fillRef>
+          <a:effectRef idx="0">
+            <a:schemeClr val="accent1"/>
+          </a:effectRef>
+          <a:fontRef idx="minor">
+            <a:schemeClr val="lt1"/>
+          </a:fontRef>
+        </p:style>
+        <p:txBody>
+          <a:bodyPr rtlCol="0" anchor="ctr"/>
+          <a:lstStyle/>
+          <a:p>
+            <a:pPr algn="ctr"/>
+            <a:endParaRPr lang="en-US"/>
+          </a:p>
+        </p:txBody>
+      </p:sp>
+      <p:sp>
+        <p:nvSpPr>
+          <p:cNvPr id="17" name="Rectangle 16"/>
+          <p:cNvSpPr/>
+          <p:nvPr/>
+        </p:nvSpPr>
+        <p:spPr>
+          <a:xfrm>
+            <a:off x="252046" y="3305908"/>
+            <a:ext cx="1225062" cy="398394"/>
+          </a:xfrm>
+          <a:prstGeom prst="rect">
+            <a:avLst/>
+          </a:prstGeom>
+          <a:noFill/>
+          <a:ln w="28575">
+            <a:solidFill>
+              <a:schemeClr val="accent1"/>
+            </a:solidFill>
+            <a:prstDash val="sysDash"/>
+          </a:ln>
+        </p:spPr>
+        <p:style>
+          <a:lnRef idx="2">
+            <a:schemeClr val="accent1">
+              <a:shade val="50000"/>
+            </a:schemeClr>
+          </a:lnRef>
+          <a:fillRef idx="1">
+            <a:schemeClr val="accent1"/>
+          </a:fillRef>
+          <a:effectRef idx="0">
+            <a:schemeClr val="accent1"/>
+          </a:effectRef>
+          <a:fontRef idx="minor">
+            <a:schemeClr val="lt1"/>
+          </a:fontRef>
+        </p:style>
+        <p:txBody>
+          <a:bodyPr rtlCol="0" anchor="ctr"/>
+          <a:lstStyle/>
+          <a:p>
+            <a:pPr algn="ctr"/>
+            <a:endParaRPr lang="en-US"/>
+          </a:p>
+        </p:txBody>
+      </p:sp>
+      <p:cxnSp>
+        <p:nvCxnSpPr>
+          <p:cNvPr id="21" name="Straight Arrow Connector 20"/>
+          <p:cNvCxnSpPr>
+            <a:stCxn id="19" idx="1"/>
+          </p:cNvCxnSpPr>
+          <p:nvPr/>
+        </p:nvCxnSpPr>
+        <p:spPr>
+          <a:xfrm flipV="1">
+            <a:off x="4982308" y="3124200"/>
+            <a:ext cx="2227384" cy="1"/>
+          </a:xfrm>
+          <a:prstGeom prst="straightConnector1">
+            <a:avLst/>
+          </a:prstGeom>
+          <a:ln w="38100">
+            <a:tailEnd type="triangle"/>
+          </a:ln>
+        </p:spPr>
+        <p:style>
+          <a:lnRef idx="1">
+            <a:schemeClr val="accent1"/>
+          </a:lnRef>
+          <a:fillRef idx="0">
+            <a:schemeClr val="accent1"/>
+          </a:fillRef>
+          <a:effectRef idx="0">
+            <a:schemeClr val="accent1"/>
+          </a:effectRef>
+          <a:fontRef idx="minor">
+            <a:schemeClr val="tx1"/>
+          </a:fontRef>
+        </p:style>
+      </p:cxnSp>
+      <p:sp>
+        <p:nvSpPr>
+          <p:cNvPr id="24" name="Rectangle 23"/>
+          <p:cNvSpPr/>
+          <p:nvPr/>
+        </p:nvSpPr>
+        <p:spPr>
+          <a:xfrm>
+            <a:off x="252046" y="4346524"/>
+            <a:ext cx="573931" cy="418907"/>
+          </a:xfrm>
+          <a:prstGeom prst="rect">
+            <a:avLst/>
+          </a:prstGeom>
+          <a:noFill/>
+          <a:ln w="28575">
+            <a:solidFill>
+              <a:schemeClr val="accent1"/>
+            </a:solidFill>
+            <a:prstDash val="sysDash"/>
+          </a:ln>
+        </p:spPr>
+        <p:style>
+          <a:lnRef idx="2">
+            <a:schemeClr val="accent1">
+              <a:shade val="50000"/>
+            </a:schemeClr>
+          </a:lnRef>
+          <a:fillRef idx="1">
+            <a:schemeClr val="accent1"/>
+          </a:fillRef>
+          <a:effectRef idx="0">
+            <a:schemeClr val="accent1"/>
+          </a:effectRef>
+          <a:fontRef idx="minor">
+            <a:schemeClr val="lt1"/>
+          </a:fontRef>
+        </p:style>
+        <p:txBody>
+          <a:bodyPr rtlCol="0" anchor="ctr"/>
+          <a:lstStyle/>
+          <a:p>
+            <a:pPr algn="ctr"/>
+            <a:endParaRPr lang="en-US"/>
+          </a:p>
+        </p:txBody>
+      </p:sp>
+      <p:cxnSp>
+        <p:nvCxnSpPr>
+          <p:cNvPr id="25" name="Straight Arrow Connector 24"/>
+          <p:cNvCxnSpPr/>
+          <p:nvPr/>
+        </p:nvCxnSpPr>
+        <p:spPr>
+          <a:xfrm flipH="1" flipV="1">
+            <a:off x="1477109" y="3704303"/>
+            <a:ext cx="2848706" cy="2081035"/>
+          </a:xfrm>
+          <a:prstGeom prst="straightConnector1">
+            <a:avLst/>
+          </a:prstGeom>
+          <a:ln w="38100">
+            <a:tailEnd type="triangle"/>
+          </a:ln>
+        </p:spPr>
+        <p:style>
+          <a:lnRef idx="1">
+            <a:schemeClr val="accent1"/>
+          </a:lnRef>
+          <a:fillRef idx="0">
+            <a:schemeClr val="accent1"/>
+          </a:fillRef>
+          <a:effectRef idx="0">
+            <a:schemeClr val="accent1"/>
+          </a:effectRef>
+          <a:fontRef idx="minor">
+            <a:schemeClr val="tx1"/>
+          </a:fontRef>
+        </p:style>
+      </p:cxnSp>
+      <p:sp>
+        <p:nvSpPr>
+          <p:cNvPr id="29" name="TextBox 28"/>
+          <p:cNvSpPr txBox="1"/>
+          <p:nvPr/>
+        </p:nvSpPr>
+        <p:spPr>
+          <a:xfrm>
+            <a:off x="7291754" y="2939534"/>
+            <a:ext cx="2053126" cy="1477328"/>
+          </a:xfrm>
+          <a:prstGeom prst="rect">
+            <a:avLst/>
+          </a:prstGeom>
+          <a:noFill/>
+        </p:spPr>
+        <p:txBody>
+          <a:bodyPr wrap="none" rtlCol="0">
+            <a:spAutoFit/>
+          </a:bodyPr>
+          <a:lstStyle/>
+          <a:p>
+            <a:r>
+              <a:rPr lang="en-US" dirty="0" err="1"/>
+              <a:t>scope.messages</a:t>
+            </a:r>
+            <a:r>
+              <a:rPr lang="en-US" dirty="0"/>
+              <a:t> = [{</a:t>
+            </a:r>
+          </a:p>
+          <a:p>
+            <a:r>
+              <a:rPr lang="en-US" dirty="0"/>
+              <a:t>    name: ‘name’,</a:t>
+            </a:r>
+          </a:p>
+          <a:p>
+            <a:r>
+              <a:rPr lang="en-US" dirty="0"/>
+              <a:t>    text: ‘text’</a:t>
+            </a:r>
+          </a:p>
+          <a:p>
+            <a:r>
+              <a:rPr lang="en-US" dirty="0"/>
+              <a:t>}]</a:t>
+            </a:r>
+          </a:p>
+          <a:p>
+            <a:r>
+              <a:rPr lang="en-US" dirty="0"/>
+              <a:t>(list of messages)</a:t>
+            </a:r>
+          </a:p>
+        </p:txBody>
+      </p:sp>
+      <p:sp>
+        <p:nvSpPr>
+          <p:cNvPr id="30" name="TextBox 29"/>
+          <p:cNvSpPr txBox="1"/>
+          <p:nvPr/>
+        </p:nvSpPr>
+        <p:spPr>
+          <a:xfrm>
+            <a:off x="4325815" y="5785338"/>
+            <a:ext cx="2537233" cy="369332"/>
+          </a:xfrm>
+          <a:prstGeom prst="rect">
+            <a:avLst/>
+          </a:prstGeom>
+          <a:noFill/>
+        </p:spPr>
+        <p:txBody>
+          <a:bodyPr wrap="none" rtlCol="0">
+            <a:spAutoFit/>
+          </a:bodyPr>
+          <a:lstStyle/>
+          <a:p>
+            <a:r>
+              <a:rPr lang="en-US" dirty="0" err="1"/>
+              <a:t>scope.messages</a:t>
+            </a:r>
+            <a:r>
+              <a:rPr lang="en-US" dirty="0"/>
+              <a:t>[3].name</a:t>
+            </a:r>
+          </a:p>
+        </p:txBody>
+      </p:sp>
+      <p:cxnSp>
+        <p:nvCxnSpPr>
+          <p:cNvPr id="18" name="Straight Arrow Connector 17"/>
+          <p:cNvCxnSpPr>
+            <a:stCxn id="14" idx="3"/>
+          </p:cNvCxnSpPr>
+          <p:nvPr/>
+        </p:nvCxnSpPr>
+        <p:spPr>
+          <a:xfrm>
+            <a:off x="5105400" y="597877"/>
+            <a:ext cx="1529862" cy="0"/>
+          </a:xfrm>
+          <a:prstGeom prst="straightConnector1">
+            <a:avLst/>
+          </a:prstGeom>
+          <a:ln w="38100">
+            <a:tailEnd type="triangle"/>
+          </a:ln>
+        </p:spPr>
+        <p:style>
+          <a:lnRef idx="1">
+            <a:schemeClr val="accent1"/>
+          </a:lnRef>
+          <a:fillRef idx="0">
+            <a:schemeClr val="accent1"/>
+          </a:fillRef>
+          <a:effectRef idx="0">
+            <a:schemeClr val="accent1"/>
+          </a:effectRef>
+          <a:fontRef idx="minor">
+            <a:schemeClr val="tx1"/>
+          </a:fontRef>
+        </p:style>
+      </p:cxnSp>
+      <p:sp>
+        <p:nvSpPr>
+          <p:cNvPr id="22" name="TextBox 21"/>
+          <p:cNvSpPr txBox="1"/>
+          <p:nvPr/>
+        </p:nvSpPr>
+        <p:spPr>
+          <a:xfrm>
+            <a:off x="6742291" y="413211"/>
+            <a:ext cx="3562514" cy="369332"/>
+          </a:xfrm>
+          <a:prstGeom prst="rect">
+            <a:avLst/>
+          </a:prstGeom>
+          <a:noFill/>
+        </p:spPr>
+        <p:txBody>
+          <a:bodyPr wrap="none" rtlCol="0">
+            <a:spAutoFit/>
+          </a:bodyPr>
+          <a:lstStyle/>
+          <a:p>
+            <a:r>
+              <a:rPr lang="en-US" dirty="0" err="1"/>
+              <a:t>scope.text</a:t>
+            </a:r>
+            <a:r>
+              <a:rPr lang="en-US" dirty="0"/>
+              <a:t> = text in the textbox here</a:t>
+            </a:r>
+          </a:p>
+        </p:txBody>
+      </p:sp>
+      <p:cxnSp>
+        <p:nvCxnSpPr>
+          <p:cNvPr id="23" name="Straight Arrow Connector 22"/>
+          <p:cNvCxnSpPr>
+            <a:stCxn id="15" idx="3"/>
+          </p:cNvCxnSpPr>
+          <p:nvPr/>
+        </p:nvCxnSpPr>
+        <p:spPr>
+          <a:xfrm flipV="1">
+            <a:off x="5081951" y="1174065"/>
+            <a:ext cx="1553311" cy="269"/>
+          </a:xfrm>
+          <a:prstGeom prst="straightConnector1">
+            <a:avLst/>
+          </a:prstGeom>
+          <a:ln w="38100">
+            <a:tailEnd type="triangle"/>
+          </a:ln>
+        </p:spPr>
+        <p:style>
+          <a:lnRef idx="1">
+            <a:schemeClr val="accent1"/>
+          </a:lnRef>
+          <a:fillRef idx="0">
+            <a:schemeClr val="accent1"/>
+          </a:fillRef>
+          <a:effectRef idx="0">
+            <a:schemeClr val="accent1"/>
+          </a:effectRef>
+          <a:fontRef idx="minor">
+            <a:schemeClr val="tx1"/>
+          </a:fontRef>
+        </p:style>
+      </p:cxnSp>
+      <p:sp>
+        <p:nvSpPr>
+          <p:cNvPr id="26" name="TextBox 25"/>
+          <p:cNvSpPr txBox="1"/>
+          <p:nvPr/>
+        </p:nvSpPr>
+        <p:spPr>
+          <a:xfrm>
+            <a:off x="6742291" y="982931"/>
+            <a:ext cx="4857694" cy="369332"/>
+          </a:xfrm>
+          <a:prstGeom prst="rect">
+            <a:avLst/>
+          </a:prstGeom>
+          <a:noFill/>
+        </p:spPr>
+        <p:txBody>
+          <a:bodyPr wrap="square" rtlCol="0">
+            <a:spAutoFit/>
+          </a:bodyPr>
+          <a:lstStyle/>
+          <a:p>
+            <a:r>
+              <a:rPr lang="en-US" dirty="0" err="1"/>
+              <a:t>scope.send</a:t>
+            </a:r>
+            <a:r>
+              <a:rPr lang="en-US" dirty="0"/>
+              <a:t>() = send text and name to server</a:t>
+            </a:r>
+          </a:p>
+        </p:txBody>
+      </p:sp>
+      <p:sp>
+        <p:nvSpPr>
+          <p:cNvPr id="19" name="Right Brace 18"/>
+          <p:cNvSpPr/>
+          <p:nvPr/>
+        </p:nvSpPr>
+        <p:spPr>
+          <a:xfrm>
+            <a:off x="4213301" y="1535723"/>
+            <a:ext cx="769007" cy="3176955"/>
+          </a:xfrm>
+          <a:prstGeom prst="rightBrace">
+            <a:avLst/>
+          </a:prstGeom>
+          <a:ln w="28575"/>
+        </p:spPr>
+        <p:style>
+          <a:lnRef idx="1">
+            <a:schemeClr val="accent1"/>
+          </a:lnRef>
+          <a:fillRef idx="0">
+            <a:schemeClr val="accent1"/>
+          </a:fillRef>
+          <a:effectRef idx="0">
+            <a:schemeClr val="accent1"/>
+          </a:effectRef>
+          <a:fontRef idx="minor">
+            <a:schemeClr val="tx1"/>
+          </a:fontRef>
+        </p:style>
+        <p:txBody>
+          <a:bodyPr rtlCol="0" anchor="ctr"/>
+          <a:lstStyle/>
+          <a:p>
+            <a:pPr algn="ctr"/>
+            <a:endParaRPr lang="en-US"/>
+          </a:p>
+        </p:txBody>
+      </p:sp>
+      <p:cxnSp>
+        <p:nvCxnSpPr>
+          <p:cNvPr id="31" name="Straight Arrow Connector 30"/>
+          <p:cNvCxnSpPr/>
+          <p:nvPr/>
+        </p:nvCxnSpPr>
+        <p:spPr>
+          <a:xfrm flipH="1" flipV="1">
+            <a:off x="839454" y="4765432"/>
+            <a:ext cx="143655" cy="1204572"/>
+          </a:xfrm>
+          <a:prstGeom prst="straightConnector1">
+            <a:avLst/>
+          </a:prstGeom>
+          <a:ln w="38100">
+            <a:tailEnd type="triangle"/>
+          </a:ln>
+        </p:spPr>
+        <p:style>
+          <a:lnRef idx="1">
+            <a:schemeClr val="accent1"/>
+          </a:lnRef>
+          <a:fillRef idx="0">
+            <a:schemeClr val="accent1"/>
+          </a:fillRef>
+          <a:effectRef idx="0">
+            <a:schemeClr val="accent1"/>
+          </a:effectRef>
+          <a:fontRef idx="minor">
+            <a:schemeClr val="tx1"/>
+          </a:fontRef>
+        </p:style>
+      </p:cxnSp>
+      <p:sp>
+        <p:nvSpPr>
+          <p:cNvPr id="36" name="TextBox 35"/>
+          <p:cNvSpPr txBox="1"/>
+          <p:nvPr/>
+        </p:nvSpPr>
+        <p:spPr>
+          <a:xfrm>
+            <a:off x="983109" y="5943162"/>
+            <a:ext cx="2363532" cy="369332"/>
+          </a:xfrm>
+          <a:prstGeom prst="rect">
+            <a:avLst/>
+          </a:prstGeom>
+          <a:noFill/>
+        </p:spPr>
+        <p:txBody>
+          <a:bodyPr wrap="none" rtlCol="0">
+            <a:spAutoFit/>
+          </a:bodyPr>
+          <a:lstStyle/>
+          <a:p>
+            <a:r>
+              <a:rPr lang="en-US" dirty="0" err="1"/>
+              <a:t>scope.messages</a:t>
+            </a:r>
+            <a:r>
+              <a:rPr lang="en-US" dirty="0"/>
+              <a:t>[4].text</a:t>
+            </a:r>
+          </a:p>
+        </p:txBody>
+      </p:sp>
+    </p:spTree>
+    <p:extLst>
+      <p:ext uri="{BB962C8B-B14F-4D97-AF65-F5344CB8AC3E}">
+        <p14:creationId xmlns:p14="http://schemas.microsoft.com/office/powerpoint/2010/main" val="2398958852"/>
+      </p:ext>
+    </p:extLst>
+  </p:cSld>
+  <p:clrMapOvr>
+    <a:masterClrMapping/>
+  </p:clrMapOvr>
+  <mc:AlternateContent xmlns:mc="http://schemas.openxmlformats.org/markup-compatibility/2006" xmlns:p14="http://schemas.microsoft.com/office/powerpoint/2010/main">
+    <mc:Choice Requires="p14">
+      <p:transition spd="med" p14:dur="700">
+        <p:fade/>
+      </p:transition>
+    </mc:Choice>
+    <mc:Fallback xmlns="">
+      <p:transition spd="med">
+        <p:fade/>
+      </p:transition>
+    </mc:Fallback>
+  </mc:AlternateContent>
+</p:sld>
+</file>
+
+<file path=ppt/slides/slide11.xml><?xml version="1.0" encoding="utf-8"?>
+<p:sld xmlns:a="http://schemas.openxmlformats.org/drawingml/2006/main" xmlns:r="http://schemas.openxmlformats.org/officeDocument/2006/relationships" xmlns:p="http://schemas.openxmlformats.org/presentationml/2006/main">
+  <p:cSld>
+    <p:spTree>
+      <p:nvGrpSpPr>
+        <p:cNvPr id="1" name=""/>
+        <p:cNvGrpSpPr/>
+        <p:nvPr/>
+      </p:nvGrpSpPr>
+      <p:grpSpPr>
+        <a:xfrm>
+          <a:off x="0" y="0"/>
+          <a:ext cx="0" cy="0"/>
+          <a:chOff x="0" y="0"/>
+          <a:chExt cx="0" cy="0"/>
+        </a:xfrm>
+      </p:grpSpPr>
       <p:sp>
         <p:nvSpPr>
           <p:cNvPr id="2" name="Title 1"/>
@@ -4204,7 +4877,1885 @@
 </p:sld>
 </file>
 
-<file path=ppt/slides/slide11.xml><?xml version="1.0" encoding="utf-8"?>
+<file path=ppt/slides/slide12.xml><?xml version="1.0" encoding="utf-8"?>
+<p:sld xmlns:a="http://schemas.openxmlformats.org/drawingml/2006/main" xmlns:r="http://schemas.openxmlformats.org/officeDocument/2006/relationships" xmlns:p="http://schemas.openxmlformats.org/presentationml/2006/main">
+  <p:cSld>
+    <p:spTree>
+      <p:nvGrpSpPr>
+        <p:cNvPr id="1" name=""/>
+        <p:cNvGrpSpPr/>
+        <p:nvPr/>
+      </p:nvGrpSpPr>
+      <p:grpSpPr>
+        <a:xfrm>
+          <a:off x="0" y="0"/>
+          <a:ext cx="0" cy="0"/>
+          <a:chOff x="0" y="0"/>
+          <a:chExt cx="0" cy="0"/>
+        </a:xfrm>
+      </p:grpSpPr>
+      <p:pic>
+        <p:nvPicPr>
+          <p:cNvPr id="4098" name="Picture 2" descr="http://storage.vexxhost.net/v1/d7594b0298b54bcc9e4e0f252e1da2e4/blog/mean-socket-io-integration-tutorial%2Fsocketio-logo.png"/>
+          <p:cNvPicPr>
+            <a:picLocks noChangeAspect="1" noChangeArrowheads="1"/>
+          </p:cNvPicPr>
+          <p:nvPr/>
+        </p:nvPicPr>
+        <p:blipFill rotWithShape="1">
+          <a:blip r:embed="rId2" cstate="print">
+            <a:extLst>
+              <a:ext uri="{28A0092B-C50C-407E-A947-70E740481C1C}">
+                <a14:useLocalDpi xmlns:a14="http://schemas.microsoft.com/office/drawing/2010/main" val="0"/>
+              </a:ext>
+            </a:extLst>
+          </a:blip>
+          <a:srcRect l="4305" t="18439" r="5299" b="23702"/>
+          <a:stretch/>
+        </p:blipFill>
+        <p:spPr bwMode="auto">
+          <a:xfrm>
+            <a:off x="9770762" y="1913117"/>
+            <a:ext cx="1237629" cy="371697"/>
+          </a:xfrm>
+          <a:prstGeom prst="rect">
+            <a:avLst/>
+          </a:prstGeom>
+          <a:noFill/>
+          <a:extLst>
+            <a:ext uri="{909E8E84-426E-40DD-AFC4-6F175D3DCCD1}">
+              <a14:hiddenFill xmlns:a14="http://schemas.microsoft.com/office/drawing/2010/main">
+                <a:solidFill>
+                  <a:srgbClr val="FFFFFF"/>
+                </a:solidFill>
+              </a14:hiddenFill>
+            </a:ext>
+          </a:extLst>
+        </p:spPr>
+      </p:pic>
+      <p:pic>
+        <p:nvPicPr>
+          <p:cNvPr id="4102" name="Picture 6" descr="http://benznext.com/wp-content/uploads/2015/04/nodejs_logo_green.jpg"/>
+          <p:cNvPicPr>
+            <a:picLocks noChangeAspect="1" noChangeArrowheads="1"/>
+          </p:cNvPicPr>
+          <p:nvPr/>
+        </p:nvPicPr>
+        <p:blipFill rotWithShape="1">
+          <a:blip r:embed="rId3" cstate="print">
+            <a:extLst>
+              <a:ext uri="{28A0092B-C50C-407E-A947-70E740481C1C}">
+                <a14:useLocalDpi xmlns:a14="http://schemas.microsoft.com/office/drawing/2010/main" val="0"/>
+              </a:ext>
+            </a:extLst>
+          </a:blip>
+          <a:srcRect l="8828" t="15310" r="4955" b="14116"/>
+          <a:stretch/>
+        </p:blipFill>
+        <p:spPr bwMode="auto">
+          <a:xfrm>
+            <a:off x="9523808" y="908086"/>
+            <a:ext cx="1731535" cy="607344"/>
+          </a:xfrm>
+          <a:prstGeom prst="rect">
+            <a:avLst/>
+          </a:prstGeom>
+          <a:noFill/>
+          <a:extLst>
+            <a:ext uri="{909E8E84-426E-40DD-AFC4-6F175D3DCCD1}">
+              <a14:hiddenFill xmlns:a14="http://schemas.microsoft.com/office/drawing/2010/main">
+                <a:solidFill>
+                  <a:srgbClr val="FFFFFF"/>
+                </a:solidFill>
+              </a14:hiddenFill>
+            </a:ext>
+          </a:extLst>
+        </p:spPr>
+      </p:pic>
+      <p:sp>
+        <p:nvSpPr>
+          <p:cNvPr id="13" name="Rectangle 12"/>
+          <p:cNvSpPr/>
+          <p:nvPr/>
+        </p:nvSpPr>
+        <p:spPr>
+          <a:xfrm>
+            <a:off x="8587154" y="788436"/>
+            <a:ext cx="3604846" cy="2290902"/>
+          </a:xfrm>
+          <a:prstGeom prst="rect">
+            <a:avLst/>
+          </a:prstGeom>
+          <a:noFill/>
+          <a:ln w="9525">
+            <a:solidFill>
+              <a:schemeClr val="accent1"/>
+            </a:solidFill>
+            <a:prstDash val="lgDash"/>
+          </a:ln>
+        </p:spPr>
+        <p:style>
+          <a:lnRef idx="2">
+            <a:schemeClr val="accent1">
+              <a:shade val="50000"/>
+            </a:schemeClr>
+          </a:lnRef>
+          <a:fillRef idx="1">
+            <a:schemeClr val="accent1"/>
+          </a:fillRef>
+          <a:effectRef idx="0">
+            <a:schemeClr val="accent1"/>
+          </a:effectRef>
+          <a:fontRef idx="minor">
+            <a:schemeClr val="lt1"/>
+          </a:fontRef>
+        </p:style>
+        <p:txBody>
+          <a:bodyPr rtlCol="0" anchor="ctr"/>
+          <a:lstStyle/>
+          <a:p>
+            <a:pPr algn="ctr"/>
+            <a:endParaRPr lang="en-US"/>
+          </a:p>
+        </p:txBody>
+      </p:sp>
+      <p:sp>
+        <p:nvSpPr>
+          <p:cNvPr id="14" name="Rectangle 13"/>
+          <p:cNvSpPr/>
+          <p:nvPr/>
+        </p:nvSpPr>
+        <p:spPr>
+          <a:xfrm>
+            <a:off x="8764095" y="1727173"/>
+            <a:ext cx="3289539" cy="1221846"/>
+          </a:xfrm>
+          <a:prstGeom prst="rect">
+            <a:avLst/>
+          </a:prstGeom>
+          <a:noFill/>
+          <a:ln w="9525">
+            <a:solidFill>
+              <a:schemeClr val="accent1"/>
+            </a:solidFill>
+            <a:prstDash val="lgDash"/>
+          </a:ln>
+        </p:spPr>
+        <p:style>
+          <a:lnRef idx="2">
+            <a:schemeClr val="accent1">
+              <a:shade val="50000"/>
+            </a:schemeClr>
+          </a:lnRef>
+          <a:fillRef idx="1">
+            <a:schemeClr val="accent1"/>
+          </a:fillRef>
+          <a:effectRef idx="0">
+            <a:schemeClr val="accent1"/>
+          </a:effectRef>
+          <a:fontRef idx="minor">
+            <a:schemeClr val="lt1"/>
+          </a:fontRef>
+        </p:style>
+        <p:txBody>
+          <a:bodyPr rtlCol="0" anchor="ctr"/>
+          <a:lstStyle/>
+          <a:p>
+            <a:pPr algn="ctr"/>
+            <a:endParaRPr lang="en-US"/>
+          </a:p>
+        </p:txBody>
+      </p:sp>
+      <p:pic>
+        <p:nvPicPr>
+          <p:cNvPr id="17" name="Picture 2" descr="http://puu.sh/nXpl5/48ee1af809.png"/>
+          <p:cNvPicPr>
+            <a:picLocks noChangeAspect="1" noChangeArrowheads="1"/>
+          </p:cNvPicPr>
+          <p:nvPr/>
+        </p:nvPicPr>
+        <p:blipFill>
+          <a:blip r:embed="rId4">
+            <a:extLst>
+              <a:ext uri="{28A0092B-C50C-407E-A947-70E740481C1C}">
+                <a14:useLocalDpi xmlns:a14="http://schemas.microsoft.com/office/drawing/2010/main" val="0"/>
+              </a:ext>
+            </a:extLst>
+          </a:blip>
+          <a:srcRect/>
+          <a:stretch>
+            <a:fillRect/>
+          </a:stretch>
+        </p:blipFill>
+        <p:spPr bwMode="auto">
+          <a:xfrm>
+            <a:off x="7088" y="779597"/>
+            <a:ext cx="3943590" cy="3763842"/>
+          </a:xfrm>
+          <a:prstGeom prst="rect">
+            <a:avLst/>
+          </a:prstGeom>
+          <a:noFill/>
+          <a:extLst>
+            <a:ext uri="{909E8E84-426E-40DD-AFC4-6F175D3DCCD1}">
+              <a14:hiddenFill xmlns:a14="http://schemas.microsoft.com/office/drawing/2010/main">
+                <a:solidFill>
+                  <a:srgbClr val="FFFFFF"/>
+                </a:solidFill>
+              </a14:hiddenFill>
+            </a:ext>
+          </a:extLst>
+        </p:spPr>
+      </p:pic>
+      <p:pic>
+        <p:nvPicPr>
+          <p:cNvPr id="1026" name="Picture 2" descr="http://puu.sh/nYtZE/2c58e14da7.png"/>
+          <p:cNvPicPr>
+            <a:picLocks noChangeAspect="1" noChangeArrowheads="1"/>
+          </p:cNvPicPr>
+          <p:nvPr/>
+        </p:nvPicPr>
+        <p:blipFill>
+          <a:blip r:embed="rId5">
+            <a:extLst>
+              <a:ext uri="{28A0092B-C50C-407E-A947-70E740481C1C}">
+                <a14:useLocalDpi xmlns:a14="http://schemas.microsoft.com/office/drawing/2010/main" val="0"/>
+              </a:ext>
+            </a:extLst>
+          </a:blip>
+          <a:srcRect/>
+          <a:stretch>
+            <a:fillRect/>
+          </a:stretch>
+        </p:blipFill>
+        <p:spPr bwMode="auto">
+          <a:xfrm>
+            <a:off x="6012123" y="5431831"/>
+            <a:ext cx="2343150" cy="1028701"/>
+          </a:xfrm>
+          <a:prstGeom prst="rect">
+            <a:avLst/>
+          </a:prstGeom>
+          <a:noFill/>
+          <a:extLst>
+            <a:ext uri="{909E8E84-426E-40DD-AFC4-6F175D3DCCD1}">
+              <a14:hiddenFill xmlns:a14="http://schemas.microsoft.com/office/drawing/2010/main">
+                <a:solidFill>
+                  <a:srgbClr val="FFFFFF"/>
+                </a:solidFill>
+              </a14:hiddenFill>
+            </a:ext>
+          </a:extLst>
+        </p:spPr>
+      </p:pic>
+      <p:pic>
+        <p:nvPicPr>
+          <p:cNvPr id="1028" name="Picture 4" descr="http://puu.sh/nYu2Y/55250f3882.png"/>
+          <p:cNvPicPr>
+            <a:picLocks noChangeAspect="1" noChangeArrowheads="1"/>
+          </p:cNvPicPr>
+          <p:nvPr/>
+        </p:nvPicPr>
+        <p:blipFill>
+          <a:blip r:embed="rId6">
+            <a:extLst>
+              <a:ext uri="{28A0092B-C50C-407E-A947-70E740481C1C}">
+                <a14:useLocalDpi xmlns:a14="http://schemas.microsoft.com/office/drawing/2010/main" val="0"/>
+              </a:ext>
+            </a:extLst>
+          </a:blip>
+          <a:srcRect/>
+          <a:stretch>
+            <a:fillRect/>
+          </a:stretch>
+        </p:blipFill>
+        <p:spPr bwMode="auto">
+          <a:xfrm>
+            <a:off x="6012124" y="1810857"/>
+            <a:ext cx="1895475" cy="1781176"/>
+          </a:xfrm>
+          <a:prstGeom prst="rect">
+            <a:avLst/>
+          </a:prstGeom>
+          <a:noFill/>
+          <a:extLst>
+            <a:ext uri="{909E8E84-426E-40DD-AFC4-6F175D3DCCD1}">
+              <a14:hiddenFill xmlns:a14="http://schemas.microsoft.com/office/drawing/2010/main">
+                <a:solidFill>
+                  <a:srgbClr val="FFFFFF"/>
+                </a:solidFill>
+              </a14:hiddenFill>
+            </a:ext>
+          </a:extLst>
+        </p:spPr>
+      </p:pic>
+      <p:pic>
+        <p:nvPicPr>
+          <p:cNvPr id="1030" name="Picture 6" descr="http://puu.sh/nYu5h/ed409a389e.png"/>
+          <p:cNvPicPr>
+            <a:picLocks noChangeAspect="1" noChangeArrowheads="1"/>
+          </p:cNvPicPr>
+          <p:nvPr/>
+        </p:nvPicPr>
+        <p:blipFill>
+          <a:blip r:embed="rId7">
+            <a:extLst>
+              <a:ext uri="{28A0092B-C50C-407E-A947-70E740481C1C}">
+                <a14:useLocalDpi xmlns:a14="http://schemas.microsoft.com/office/drawing/2010/main" val="0"/>
+              </a:ext>
+            </a:extLst>
+          </a:blip>
+          <a:srcRect/>
+          <a:stretch>
+            <a:fillRect/>
+          </a:stretch>
+        </p:blipFill>
+        <p:spPr bwMode="auto">
+          <a:xfrm>
+            <a:off x="3732583" y="1515430"/>
+            <a:ext cx="1496628" cy="243042"/>
+          </a:xfrm>
+          <a:prstGeom prst="rect">
+            <a:avLst/>
+          </a:prstGeom>
+          <a:noFill/>
+          <a:extLst>
+            <a:ext uri="{909E8E84-426E-40DD-AFC4-6F175D3DCCD1}">
+              <a14:hiddenFill xmlns:a14="http://schemas.microsoft.com/office/drawing/2010/main">
+                <a:solidFill>
+                  <a:srgbClr val="FFFFFF"/>
+                </a:solidFill>
+              </a14:hiddenFill>
+            </a:ext>
+          </a:extLst>
+        </p:spPr>
+      </p:pic>
+      <p:pic>
+        <p:nvPicPr>
+          <p:cNvPr id="1032" name="Picture 8" descr="http://puu.sh/nYu8q/b95af89bda.png"/>
+          <p:cNvPicPr>
+            <a:picLocks noChangeAspect="1" noChangeArrowheads="1"/>
+          </p:cNvPicPr>
+          <p:nvPr/>
+        </p:nvPicPr>
+        <p:blipFill>
+          <a:blip r:embed="rId8">
+            <a:extLst>
+              <a:ext uri="{28A0092B-C50C-407E-A947-70E740481C1C}">
+                <a14:useLocalDpi xmlns:a14="http://schemas.microsoft.com/office/drawing/2010/main" val="0"/>
+              </a:ext>
+            </a:extLst>
+          </a:blip>
+          <a:srcRect/>
+          <a:stretch>
+            <a:fillRect/>
+          </a:stretch>
+        </p:blipFill>
+        <p:spPr bwMode="auto">
+          <a:xfrm>
+            <a:off x="0" y="4735499"/>
+            <a:ext cx="4133850" cy="1171575"/>
+          </a:xfrm>
+          <a:prstGeom prst="rect">
+            <a:avLst/>
+          </a:prstGeom>
+          <a:noFill/>
+          <a:extLst>
+            <a:ext uri="{909E8E84-426E-40DD-AFC4-6F175D3DCCD1}">
+              <a14:hiddenFill xmlns:a14="http://schemas.microsoft.com/office/drawing/2010/main">
+                <a:solidFill>
+                  <a:srgbClr val="FFFFFF"/>
+                </a:solidFill>
+              </a14:hiddenFill>
+            </a:ext>
+          </a:extLst>
+        </p:spPr>
+      </p:pic>
+      <p:pic>
+        <p:nvPicPr>
+          <p:cNvPr id="1034" name="Picture 10" descr="http://puu.sh/nYudf/fbcd0b5361.png"/>
+          <p:cNvPicPr>
+            <a:picLocks noChangeAspect="1" noChangeArrowheads="1"/>
+          </p:cNvPicPr>
+          <p:nvPr/>
+        </p:nvPicPr>
+        <p:blipFill>
+          <a:blip r:embed="rId9">
+            <a:extLst>
+              <a:ext uri="{28A0092B-C50C-407E-A947-70E740481C1C}">
+                <a14:useLocalDpi xmlns:a14="http://schemas.microsoft.com/office/drawing/2010/main" val="0"/>
+              </a:ext>
+            </a:extLst>
+          </a:blip>
+          <a:srcRect/>
+          <a:stretch>
+            <a:fillRect/>
+          </a:stretch>
+        </p:blipFill>
+        <p:spPr bwMode="auto">
+          <a:xfrm>
+            <a:off x="8769958" y="2472845"/>
+            <a:ext cx="3267076" cy="228600"/>
+          </a:xfrm>
+          <a:prstGeom prst="rect">
+            <a:avLst/>
+          </a:prstGeom>
+          <a:noFill/>
+          <a:extLst>
+            <a:ext uri="{909E8E84-426E-40DD-AFC4-6F175D3DCCD1}">
+              <a14:hiddenFill xmlns:a14="http://schemas.microsoft.com/office/drawing/2010/main">
+                <a:solidFill>
+                  <a:srgbClr val="FFFFFF"/>
+                </a:solidFill>
+              </a14:hiddenFill>
+            </a:ext>
+          </a:extLst>
+        </p:spPr>
+      </p:pic>
+      <p:sp>
+        <p:nvSpPr>
+          <p:cNvPr id="8" name="Right Brace 7"/>
+          <p:cNvSpPr/>
+          <p:nvPr/>
+        </p:nvSpPr>
+        <p:spPr>
+          <a:xfrm>
+            <a:off x="3165231" y="3217996"/>
+            <a:ext cx="192565" cy="562708"/>
+          </a:xfrm>
+          <a:prstGeom prst="rightBrace">
+            <a:avLst/>
+          </a:prstGeom>
+          <a:ln w="28575"/>
+        </p:spPr>
+        <p:style>
+          <a:lnRef idx="1">
+            <a:schemeClr val="accent1"/>
+          </a:lnRef>
+          <a:fillRef idx="0">
+            <a:schemeClr val="accent1"/>
+          </a:fillRef>
+          <a:effectRef idx="0">
+            <a:schemeClr val="accent1"/>
+          </a:effectRef>
+          <a:fontRef idx="minor">
+            <a:schemeClr val="tx1"/>
+          </a:fontRef>
+        </p:style>
+        <p:txBody>
+          <a:bodyPr rtlCol="0" anchor="ctr"/>
+          <a:lstStyle/>
+          <a:p>
+            <a:pPr algn="ctr"/>
+            <a:endParaRPr lang="en-US"/>
+          </a:p>
+        </p:txBody>
+      </p:sp>
+      <p:cxnSp>
+        <p:nvCxnSpPr>
+          <p:cNvPr id="12" name="Elbow Connector 11"/>
+          <p:cNvCxnSpPr>
+            <a:stCxn id="8" idx="1"/>
+            <a:endCxn id="1032" idx="3"/>
+          </p:cNvCxnSpPr>
+          <p:nvPr/>
+        </p:nvCxnSpPr>
+        <p:spPr>
+          <a:xfrm rot="10800000" flipH="1" flipV="1">
+            <a:off x="3357796" y="3499349"/>
+            <a:ext cx="776054" cy="1821937"/>
+          </a:xfrm>
+          <a:prstGeom prst="bentConnector5">
+            <a:avLst>
+              <a:gd name="adj1" fmla="val 129156"/>
+              <a:gd name="adj2" fmla="val 41645"/>
+              <a:gd name="adj3" fmla="val 129457"/>
+            </a:avLst>
+          </a:prstGeom>
+          <a:ln w="28575">
+            <a:tailEnd type="triangle"/>
+          </a:ln>
+        </p:spPr>
+        <p:style>
+          <a:lnRef idx="1">
+            <a:schemeClr val="accent1"/>
+          </a:lnRef>
+          <a:fillRef idx="0">
+            <a:schemeClr val="accent1"/>
+          </a:fillRef>
+          <a:effectRef idx="0">
+            <a:schemeClr val="accent1"/>
+          </a:effectRef>
+          <a:fontRef idx="minor">
+            <a:schemeClr val="tx1"/>
+          </a:fontRef>
+        </p:style>
+      </p:cxnSp>
+      <p:pic>
+        <p:nvPicPr>
+          <p:cNvPr id="1036" name="Picture 12" descr="http://puu.sh/nYupu/f9343fff17.png"/>
+          <p:cNvPicPr>
+            <a:picLocks noChangeAspect="1" noChangeArrowheads="1"/>
+          </p:cNvPicPr>
+          <p:nvPr/>
+        </p:nvPicPr>
+        <p:blipFill>
+          <a:blip r:embed="rId10">
+            <a:extLst>
+              <a:ext uri="{28A0092B-C50C-407E-A947-70E740481C1C}">
+                <a14:useLocalDpi xmlns:a14="http://schemas.microsoft.com/office/drawing/2010/main" val="0"/>
+              </a:ext>
+            </a:extLst>
+          </a:blip>
+          <a:srcRect/>
+          <a:stretch>
+            <a:fillRect/>
+          </a:stretch>
+        </p:blipFill>
+        <p:spPr bwMode="auto">
+          <a:xfrm>
+            <a:off x="1360491" y="1028971"/>
+            <a:ext cx="1383174" cy="212796"/>
+          </a:xfrm>
+          <a:prstGeom prst="rect">
+            <a:avLst/>
+          </a:prstGeom>
+          <a:noFill/>
+          <a:extLst>
+            <a:ext uri="{909E8E84-426E-40DD-AFC4-6F175D3DCCD1}">
+              <a14:hiddenFill xmlns:a14="http://schemas.microsoft.com/office/drawing/2010/main">
+                <a:solidFill>
+                  <a:srgbClr val="FFFFFF"/>
+                </a:solidFill>
+              </a14:hiddenFill>
+            </a:ext>
+          </a:extLst>
+        </p:spPr>
+      </p:pic>
+      <p:sp>
+        <p:nvSpPr>
+          <p:cNvPr id="29" name="Right Brace 28"/>
+          <p:cNvSpPr/>
+          <p:nvPr/>
+        </p:nvSpPr>
+        <p:spPr>
+          <a:xfrm>
+            <a:off x="3165230" y="2129897"/>
+            <a:ext cx="192565" cy="562708"/>
+          </a:xfrm>
+          <a:prstGeom prst="rightBrace">
+            <a:avLst/>
+          </a:prstGeom>
+          <a:ln w="28575"/>
+        </p:spPr>
+        <p:style>
+          <a:lnRef idx="1">
+            <a:schemeClr val="accent1"/>
+          </a:lnRef>
+          <a:fillRef idx="0">
+            <a:schemeClr val="accent1"/>
+          </a:fillRef>
+          <a:effectRef idx="0">
+            <a:schemeClr val="accent1"/>
+          </a:effectRef>
+          <a:fontRef idx="minor">
+            <a:schemeClr val="tx1"/>
+          </a:fontRef>
+        </p:style>
+        <p:txBody>
+          <a:bodyPr rtlCol="0" anchor="ctr"/>
+          <a:lstStyle/>
+          <a:p>
+            <a:pPr algn="ctr"/>
+            <a:endParaRPr lang="en-US"/>
+          </a:p>
+        </p:txBody>
+      </p:sp>
+      <p:cxnSp>
+        <p:nvCxnSpPr>
+          <p:cNvPr id="21" name="Elbow Connector 20"/>
+          <p:cNvCxnSpPr>
+            <a:stCxn id="29" idx="1"/>
+          </p:cNvCxnSpPr>
+          <p:nvPr/>
+        </p:nvCxnSpPr>
+        <p:spPr>
+          <a:xfrm rot="10800000" flipH="1" flipV="1">
+            <a:off x="3357795" y="2411251"/>
+            <a:ext cx="1003190" cy="1344588"/>
+          </a:xfrm>
+          <a:prstGeom prst="bentConnector4">
+            <a:avLst>
+              <a:gd name="adj1" fmla="val 99914"/>
+              <a:gd name="adj2" fmla="val 60462"/>
+            </a:avLst>
+          </a:prstGeom>
+          <a:ln w="28575"/>
+        </p:spPr>
+        <p:style>
+          <a:lnRef idx="1">
+            <a:schemeClr val="accent1"/>
+          </a:lnRef>
+          <a:fillRef idx="0">
+            <a:schemeClr val="accent1"/>
+          </a:fillRef>
+          <a:effectRef idx="0">
+            <a:schemeClr val="accent1"/>
+          </a:effectRef>
+          <a:fontRef idx="minor">
+            <a:schemeClr val="tx1"/>
+          </a:fontRef>
+        </p:style>
+      </p:cxnSp>
+      <p:pic>
+        <p:nvPicPr>
+          <p:cNvPr id="36" name="Picture 8" descr="http://puu.sh/nYu8q/b95af89bda.png"/>
+          <p:cNvPicPr>
+            <a:picLocks noChangeAspect="1" noChangeArrowheads="1"/>
+          </p:cNvPicPr>
+          <p:nvPr/>
+        </p:nvPicPr>
+        <p:blipFill rotWithShape="1">
+          <a:blip r:embed="rId8">
+            <a:extLst>
+              <a:ext uri="{28A0092B-C50C-407E-A947-70E740481C1C}">
+                <a14:useLocalDpi xmlns:a14="http://schemas.microsoft.com/office/drawing/2010/main" val="0"/>
+              </a:ext>
+            </a:extLst>
+          </a:blip>
+          <a:srcRect l="13772" t="29524" r="46951" b="41833"/>
+          <a:stretch/>
+        </p:blipFill>
+        <p:spPr bwMode="auto">
+          <a:xfrm>
+            <a:off x="957003" y="2716051"/>
+            <a:ext cx="2084637" cy="430901"/>
+          </a:xfrm>
+          <a:prstGeom prst="rect">
+            <a:avLst/>
+          </a:prstGeom>
+          <a:noFill/>
+          <a:extLst>
+            <a:ext uri="{909E8E84-426E-40DD-AFC4-6F175D3DCCD1}">
+              <a14:hiddenFill xmlns:a14="http://schemas.microsoft.com/office/drawing/2010/main">
+                <a:solidFill>
+                  <a:srgbClr val="FFFFFF"/>
+                </a:solidFill>
+              </a14:hiddenFill>
+            </a:ext>
+          </a:extLst>
+        </p:spPr>
+      </p:pic>
+      <p:pic>
+        <p:nvPicPr>
+          <p:cNvPr id="1038" name="Picture 14" descr="http://puu.sh/nYuUc/f4ab91b1f6.png"/>
+          <p:cNvPicPr>
+            <a:picLocks noChangeAspect="1" noChangeArrowheads="1"/>
+          </p:cNvPicPr>
+          <p:nvPr/>
+        </p:nvPicPr>
+        <p:blipFill rotWithShape="1">
+          <a:blip r:embed="rId11">
+            <a:extLst>
+              <a:ext uri="{28A0092B-C50C-407E-A947-70E740481C1C}">
+                <a14:useLocalDpi xmlns:a14="http://schemas.microsoft.com/office/drawing/2010/main" val="0"/>
+              </a:ext>
+            </a:extLst>
+          </a:blip>
+          <a:srcRect t="53211" r="17927" b="3171"/>
+          <a:stretch/>
+        </p:blipFill>
+        <p:spPr bwMode="auto">
+          <a:xfrm>
+            <a:off x="6012123" y="1019066"/>
+            <a:ext cx="1531873" cy="232606"/>
+          </a:xfrm>
+          <a:prstGeom prst="rect">
+            <a:avLst/>
+          </a:prstGeom>
+          <a:noFill/>
+          <a:extLst>
+            <a:ext uri="{909E8E84-426E-40DD-AFC4-6F175D3DCCD1}">
+              <a14:hiddenFill xmlns:a14="http://schemas.microsoft.com/office/drawing/2010/main">
+                <a:solidFill>
+                  <a:srgbClr val="FFFFFF"/>
+                </a:solidFill>
+              </a14:hiddenFill>
+            </a:ext>
+          </a:extLst>
+        </p:spPr>
+      </p:pic>
+      <p:cxnSp>
+        <p:nvCxnSpPr>
+          <p:cNvPr id="28" name="Straight Arrow Connector 27"/>
+          <p:cNvCxnSpPr>
+            <a:stCxn id="1038" idx="1"/>
+            <a:endCxn id="1036" idx="3"/>
+          </p:cNvCxnSpPr>
+          <p:nvPr/>
+        </p:nvCxnSpPr>
+        <p:spPr>
+          <a:xfrm flipH="1">
+            <a:off x="2743665" y="1135369"/>
+            <a:ext cx="3268458" cy="0"/>
+          </a:xfrm>
+          <a:prstGeom prst="straightConnector1">
+            <a:avLst/>
+          </a:prstGeom>
+          <a:ln w="28575">
+            <a:headEnd type="triangle"/>
+            <a:tailEnd type="triangle"/>
+          </a:ln>
+        </p:spPr>
+        <p:style>
+          <a:lnRef idx="1">
+            <a:schemeClr val="accent1"/>
+          </a:lnRef>
+          <a:fillRef idx="0">
+            <a:schemeClr val="accent1"/>
+          </a:fillRef>
+          <a:effectRef idx="0">
+            <a:schemeClr val="accent1"/>
+          </a:effectRef>
+          <a:fontRef idx="minor">
+            <a:schemeClr val="tx1"/>
+          </a:fontRef>
+        </p:style>
+      </p:cxnSp>
+      <p:pic>
+        <p:nvPicPr>
+          <p:cNvPr id="46" name="Picture 14" descr="http://puu.sh/nYuUc/f4ab91b1f6.png"/>
+          <p:cNvPicPr>
+            <a:picLocks noChangeAspect="1" noChangeArrowheads="1"/>
+          </p:cNvPicPr>
+          <p:nvPr/>
+        </p:nvPicPr>
+        <p:blipFill rotWithShape="1">
+          <a:blip r:embed="rId11">
+            <a:extLst>
+              <a:ext uri="{28A0092B-C50C-407E-A947-70E740481C1C}">
+                <a14:useLocalDpi xmlns:a14="http://schemas.microsoft.com/office/drawing/2010/main" val="0"/>
+              </a:ext>
+            </a:extLst>
+          </a:blip>
+          <a:srcRect t="-633" r="-1554" b="40149"/>
+          <a:stretch/>
+        </p:blipFill>
+        <p:spPr bwMode="auto">
+          <a:xfrm>
+            <a:off x="6012123" y="4678473"/>
+            <a:ext cx="1832888" cy="311898"/>
+          </a:xfrm>
+          <a:prstGeom prst="rect">
+            <a:avLst/>
+          </a:prstGeom>
+          <a:noFill/>
+          <a:extLst>
+            <a:ext uri="{909E8E84-426E-40DD-AFC4-6F175D3DCCD1}">
+              <a14:hiddenFill xmlns:a14="http://schemas.microsoft.com/office/drawing/2010/main">
+                <a:solidFill>
+                  <a:srgbClr val="FFFFFF"/>
+                </a:solidFill>
+              </a14:hiddenFill>
+            </a:ext>
+          </a:extLst>
+        </p:spPr>
+      </p:pic>
+      <p:cxnSp>
+        <p:nvCxnSpPr>
+          <p:cNvPr id="40" name="Elbow Connector 39"/>
+          <p:cNvCxnSpPr/>
+          <p:nvPr/>
+        </p:nvCxnSpPr>
+        <p:spPr>
+          <a:xfrm>
+            <a:off x="7841493" y="2238025"/>
+            <a:ext cx="1883374" cy="281356"/>
+          </a:xfrm>
+          <a:prstGeom prst="bentConnector3">
+            <a:avLst>
+              <a:gd name="adj1" fmla="val 99796"/>
+            </a:avLst>
+          </a:prstGeom>
+          <a:ln w="28575">
+            <a:tailEnd type="triangle"/>
+          </a:ln>
+        </p:spPr>
+        <p:style>
+          <a:lnRef idx="1">
+            <a:schemeClr val="accent1"/>
+          </a:lnRef>
+          <a:fillRef idx="0">
+            <a:schemeClr val="accent1"/>
+          </a:fillRef>
+          <a:effectRef idx="0">
+            <a:schemeClr val="accent1"/>
+          </a:effectRef>
+          <a:fontRef idx="minor">
+            <a:schemeClr val="tx1"/>
+          </a:fontRef>
+        </p:style>
+      </p:cxnSp>
+      <p:cxnSp>
+        <p:nvCxnSpPr>
+          <p:cNvPr id="43" name="Elbow Connector 42"/>
+          <p:cNvCxnSpPr/>
+          <p:nvPr/>
+        </p:nvCxnSpPr>
+        <p:spPr>
+          <a:xfrm rot="10800000" flipV="1">
+            <a:off x="7907599" y="2716050"/>
+            <a:ext cx="3347746" cy="2782083"/>
+          </a:xfrm>
+          <a:prstGeom prst="bentConnector3">
+            <a:avLst>
+              <a:gd name="adj1" fmla="val -75"/>
+            </a:avLst>
+          </a:prstGeom>
+          <a:ln w="28575">
+            <a:tailEnd type="triangle"/>
+          </a:ln>
+        </p:spPr>
+        <p:style>
+          <a:lnRef idx="1">
+            <a:schemeClr val="accent1"/>
+          </a:lnRef>
+          <a:fillRef idx="0">
+            <a:schemeClr val="accent1"/>
+          </a:fillRef>
+          <a:effectRef idx="0">
+            <a:schemeClr val="accent1"/>
+          </a:effectRef>
+          <a:fontRef idx="minor">
+            <a:schemeClr val="tx1"/>
+          </a:fontRef>
+        </p:style>
+      </p:cxnSp>
+      <p:cxnSp>
+        <p:nvCxnSpPr>
+          <p:cNvPr id="52" name="Elbow Connector 51"/>
+          <p:cNvCxnSpPr>
+            <a:stCxn id="1026" idx="1"/>
+            <a:endCxn id="46" idx="1"/>
+          </p:cNvCxnSpPr>
+          <p:nvPr/>
+        </p:nvCxnSpPr>
+        <p:spPr>
+          <a:xfrm rot="10800000">
+            <a:off x="6012123" y="4834422"/>
+            <a:ext cx="12700" cy="1111760"/>
+          </a:xfrm>
+          <a:prstGeom prst="bentConnector3">
+            <a:avLst>
+              <a:gd name="adj1" fmla="val 1800000"/>
+            </a:avLst>
+          </a:prstGeom>
+          <a:ln w="28575">
+            <a:tailEnd type="triangle"/>
+          </a:ln>
+        </p:spPr>
+        <p:style>
+          <a:lnRef idx="1">
+            <a:schemeClr val="accent1"/>
+          </a:lnRef>
+          <a:fillRef idx="0">
+            <a:schemeClr val="accent1"/>
+          </a:fillRef>
+          <a:effectRef idx="0">
+            <a:schemeClr val="accent1"/>
+          </a:effectRef>
+          <a:fontRef idx="minor">
+            <a:schemeClr val="tx1"/>
+          </a:fontRef>
+        </p:style>
+      </p:cxnSp>
+      <p:cxnSp>
+        <p:nvCxnSpPr>
+          <p:cNvPr id="54" name="Elbow Connector 53"/>
+          <p:cNvCxnSpPr>
+            <a:stCxn id="1030" idx="3"/>
+            <a:endCxn id="1028" idx="0"/>
+          </p:cNvCxnSpPr>
+          <p:nvPr/>
+        </p:nvCxnSpPr>
+        <p:spPr>
+          <a:xfrm>
+            <a:off x="5229211" y="1636951"/>
+            <a:ext cx="1730651" cy="173906"/>
+          </a:xfrm>
+          <a:prstGeom prst="bentConnector2">
+            <a:avLst/>
+          </a:prstGeom>
+          <a:ln w="28575">
+            <a:tailEnd type="triangle"/>
+          </a:ln>
+        </p:spPr>
+        <p:style>
+          <a:lnRef idx="1">
+            <a:schemeClr val="accent1"/>
+          </a:lnRef>
+          <a:fillRef idx="0">
+            <a:schemeClr val="accent1"/>
+          </a:fillRef>
+          <a:effectRef idx="0">
+            <a:schemeClr val="accent1"/>
+          </a:effectRef>
+          <a:fontRef idx="minor">
+            <a:schemeClr val="tx1"/>
+          </a:fontRef>
+        </p:style>
+      </p:cxnSp>
+      <p:cxnSp>
+        <p:nvCxnSpPr>
+          <p:cNvPr id="56" name="Straight Connector 55"/>
+          <p:cNvCxnSpPr/>
+          <p:nvPr/>
+        </p:nvCxnSpPr>
+        <p:spPr>
+          <a:xfrm flipH="1">
+            <a:off x="5229211" y="0"/>
+            <a:ext cx="46174" cy="6858000"/>
+          </a:xfrm>
+          <a:prstGeom prst="line">
+            <a:avLst/>
+          </a:prstGeom>
+          <a:ln>
+            <a:prstDash val="dash"/>
+          </a:ln>
+        </p:spPr>
+        <p:style>
+          <a:lnRef idx="1">
+            <a:schemeClr val="accent1"/>
+          </a:lnRef>
+          <a:fillRef idx="0">
+            <a:schemeClr val="accent1"/>
+          </a:fillRef>
+          <a:effectRef idx="0">
+            <a:schemeClr val="accent1"/>
+          </a:effectRef>
+          <a:fontRef idx="minor">
+            <a:schemeClr val="tx1"/>
+          </a:fontRef>
+        </p:style>
+      </p:cxnSp>
+      <p:cxnSp>
+        <p:nvCxnSpPr>
+          <p:cNvPr id="67" name="Straight Connector 66"/>
+          <p:cNvCxnSpPr/>
+          <p:nvPr/>
+        </p:nvCxnSpPr>
+        <p:spPr>
+          <a:xfrm flipH="1">
+            <a:off x="8441329" y="-11730"/>
+            <a:ext cx="46174" cy="6858000"/>
+          </a:xfrm>
+          <a:prstGeom prst="line">
+            <a:avLst/>
+          </a:prstGeom>
+          <a:ln>
+            <a:prstDash val="dash"/>
+          </a:ln>
+        </p:spPr>
+        <p:style>
+          <a:lnRef idx="1">
+            <a:schemeClr val="accent1"/>
+          </a:lnRef>
+          <a:fillRef idx="0">
+            <a:schemeClr val="accent1"/>
+          </a:fillRef>
+          <a:effectRef idx="0">
+            <a:schemeClr val="accent1"/>
+          </a:effectRef>
+          <a:fontRef idx="minor">
+            <a:schemeClr val="tx1"/>
+          </a:fontRef>
+        </p:style>
+      </p:cxnSp>
+      <p:sp>
+        <p:nvSpPr>
+          <p:cNvPr id="57" name="TextBox 56"/>
+          <p:cNvSpPr txBox="1"/>
+          <p:nvPr/>
+        </p:nvSpPr>
+        <p:spPr>
+          <a:xfrm>
+            <a:off x="1856344" y="-14856"/>
+            <a:ext cx="1184170" cy="369332"/>
+          </a:xfrm>
+          <a:prstGeom prst="rect">
+            <a:avLst/>
+          </a:prstGeom>
+          <a:noFill/>
+        </p:spPr>
+        <p:txBody>
+          <a:bodyPr wrap="none" rtlCol="0">
+            <a:spAutoFit/>
+          </a:bodyPr>
+          <a:lstStyle/>
+          <a:p>
+            <a:r>
+              <a:rPr lang="en-US" dirty="0"/>
+              <a:t>index.html</a:t>
+            </a:r>
+          </a:p>
+        </p:txBody>
+      </p:sp>
+      <p:sp>
+        <p:nvSpPr>
+          <p:cNvPr id="69" name="TextBox 68"/>
+          <p:cNvSpPr txBox="1"/>
+          <p:nvPr/>
+        </p:nvSpPr>
+        <p:spPr>
+          <a:xfrm>
+            <a:off x="6407605" y="-12509"/>
+            <a:ext cx="740908" cy="369332"/>
+          </a:xfrm>
+          <a:prstGeom prst="rect">
+            <a:avLst/>
+          </a:prstGeom>
+          <a:noFill/>
+        </p:spPr>
+        <p:txBody>
+          <a:bodyPr wrap="none" rtlCol="0">
+            <a:spAutoFit/>
+          </a:bodyPr>
+          <a:lstStyle/>
+          <a:p>
+            <a:r>
+              <a:rPr lang="en-US" dirty="0"/>
+              <a:t>app.js</a:t>
+            </a:r>
+          </a:p>
+        </p:txBody>
+      </p:sp>
+      <p:sp>
+        <p:nvSpPr>
+          <p:cNvPr id="70" name="TextBox 69"/>
+          <p:cNvSpPr txBox="1"/>
+          <p:nvPr/>
+        </p:nvSpPr>
+        <p:spPr>
+          <a:xfrm>
+            <a:off x="9929295" y="-21813"/>
+            <a:ext cx="948401" cy="369332"/>
+          </a:xfrm>
+          <a:prstGeom prst="rect">
+            <a:avLst/>
+          </a:prstGeom>
+          <a:noFill/>
+        </p:spPr>
+        <p:txBody>
+          <a:bodyPr wrap="none" rtlCol="0">
+            <a:spAutoFit/>
+          </a:bodyPr>
+          <a:lstStyle/>
+          <a:p>
+            <a:r>
+              <a:rPr lang="en-US" dirty="0"/>
+              <a:t>server.js</a:t>
+            </a:r>
+          </a:p>
+        </p:txBody>
+      </p:sp>
+      <p:cxnSp>
+        <p:nvCxnSpPr>
+          <p:cNvPr id="71" name="Straight Connector 70"/>
+          <p:cNvCxnSpPr/>
+          <p:nvPr/>
+        </p:nvCxnSpPr>
+        <p:spPr>
+          <a:xfrm flipH="1">
+            <a:off x="-104469" y="366126"/>
+            <a:ext cx="12423957" cy="6374"/>
+          </a:xfrm>
+          <a:prstGeom prst="line">
+            <a:avLst/>
+          </a:prstGeom>
+          <a:ln>
+            <a:prstDash val="dash"/>
+          </a:ln>
+        </p:spPr>
+        <p:style>
+          <a:lnRef idx="1">
+            <a:schemeClr val="accent1"/>
+          </a:lnRef>
+          <a:fillRef idx="0">
+            <a:schemeClr val="accent1"/>
+          </a:fillRef>
+          <a:effectRef idx="0">
+            <a:schemeClr val="accent1"/>
+          </a:effectRef>
+          <a:fontRef idx="minor">
+            <a:schemeClr val="tx1"/>
+          </a:fontRef>
+        </p:style>
+      </p:cxnSp>
+    </p:spTree>
+    <p:extLst>
+      <p:ext uri="{BB962C8B-B14F-4D97-AF65-F5344CB8AC3E}">
+        <p14:creationId xmlns:p14="http://schemas.microsoft.com/office/powerpoint/2010/main" val="1351162170"/>
+      </p:ext>
+    </p:extLst>
+  </p:cSld>
+  <p:clrMapOvr>
+    <a:masterClrMapping/>
+  </p:clrMapOvr>
+  <mc:AlternateContent xmlns:mc="http://schemas.openxmlformats.org/markup-compatibility/2006" xmlns:p14="http://schemas.microsoft.com/office/powerpoint/2010/main">
+    <mc:Choice Requires="p14">
+      <p:transition spd="med" p14:dur="700">
+        <p:fade/>
+      </p:transition>
+    </mc:Choice>
+    <mc:Fallback xmlns="">
+      <p:transition spd="med">
+        <p:fade/>
+      </p:transition>
+    </mc:Fallback>
+  </mc:AlternateContent>
+</p:sld>
+</file>
+
+<file path=ppt/slides/slide13.xml><?xml version="1.0" encoding="utf-8"?>
+<p:sld xmlns:a="http://schemas.openxmlformats.org/drawingml/2006/main" xmlns:r="http://schemas.openxmlformats.org/officeDocument/2006/relationships" xmlns:p="http://schemas.openxmlformats.org/presentationml/2006/main">
+  <p:cSld>
+    <p:spTree>
+      <p:nvGrpSpPr>
+        <p:cNvPr id="1" name=""/>
+        <p:cNvGrpSpPr/>
+        <p:nvPr/>
+      </p:nvGrpSpPr>
+      <p:grpSpPr>
+        <a:xfrm>
+          <a:off x="0" y="0"/>
+          <a:ext cx="0" cy="0"/>
+          <a:chOff x="0" y="0"/>
+          <a:chExt cx="0" cy="0"/>
+        </a:xfrm>
+      </p:grpSpPr>
+      <p:pic>
+        <p:nvPicPr>
+          <p:cNvPr id="4" name="Picture 2" descr="http://storage.vexxhost.net/v1/d7594b0298b54bcc9e4e0f252e1da2e4/blog/mean-socket-io-integration-tutorial%2Fsocketio-logo.png"/>
+          <p:cNvPicPr>
+            <a:picLocks noChangeAspect="1" noChangeArrowheads="1"/>
+          </p:cNvPicPr>
+          <p:nvPr/>
+        </p:nvPicPr>
+        <p:blipFill rotWithShape="1">
+          <a:blip r:embed="rId2" cstate="print">
+            <a:extLst>
+              <a:ext uri="{28A0092B-C50C-407E-A947-70E740481C1C}">
+                <a14:useLocalDpi xmlns:a14="http://schemas.microsoft.com/office/drawing/2010/main" val="0"/>
+              </a:ext>
+            </a:extLst>
+          </a:blip>
+          <a:srcRect l="4305" t="18439" r="5299" b="23702"/>
+          <a:stretch/>
+        </p:blipFill>
+        <p:spPr bwMode="auto">
+          <a:xfrm>
+            <a:off x="5960761" y="2326296"/>
+            <a:ext cx="1237629" cy="371697"/>
+          </a:xfrm>
+          <a:prstGeom prst="rect">
+            <a:avLst/>
+          </a:prstGeom>
+          <a:noFill/>
+          <a:extLst>
+            <a:ext uri="{909E8E84-426E-40DD-AFC4-6F175D3DCCD1}">
+              <a14:hiddenFill xmlns:a14="http://schemas.microsoft.com/office/drawing/2010/main">
+                <a:solidFill>
+                  <a:srgbClr val="FFFFFF"/>
+                </a:solidFill>
+              </a14:hiddenFill>
+            </a:ext>
+          </a:extLst>
+        </p:spPr>
+      </p:pic>
+      <p:pic>
+        <p:nvPicPr>
+          <p:cNvPr id="5" name="Picture 6" descr="http://benznext.com/wp-content/uploads/2015/04/nodejs_logo_green.jpg"/>
+          <p:cNvPicPr>
+            <a:picLocks noChangeAspect="1" noChangeArrowheads="1"/>
+          </p:cNvPicPr>
+          <p:nvPr/>
+        </p:nvPicPr>
+        <p:blipFill rotWithShape="1">
+          <a:blip r:embed="rId3" cstate="print">
+            <a:extLst>
+              <a:ext uri="{28A0092B-C50C-407E-A947-70E740481C1C}">
+                <a14:useLocalDpi xmlns:a14="http://schemas.microsoft.com/office/drawing/2010/main" val="0"/>
+              </a:ext>
+            </a:extLst>
+          </a:blip>
+          <a:srcRect l="8828" t="15310" r="4955" b="14116"/>
+          <a:stretch/>
+        </p:blipFill>
+        <p:spPr bwMode="auto">
+          <a:xfrm>
+            <a:off x="5713807" y="1321265"/>
+            <a:ext cx="1731535" cy="607344"/>
+          </a:xfrm>
+          <a:prstGeom prst="rect">
+            <a:avLst/>
+          </a:prstGeom>
+          <a:noFill/>
+          <a:extLst>
+            <a:ext uri="{909E8E84-426E-40DD-AFC4-6F175D3DCCD1}">
+              <a14:hiddenFill xmlns:a14="http://schemas.microsoft.com/office/drawing/2010/main">
+                <a:solidFill>
+                  <a:srgbClr val="FFFFFF"/>
+                </a:solidFill>
+              </a14:hiddenFill>
+            </a:ext>
+          </a:extLst>
+        </p:spPr>
+      </p:pic>
+      <p:sp>
+        <p:nvSpPr>
+          <p:cNvPr id="6" name="Rectangle 5"/>
+          <p:cNvSpPr/>
+          <p:nvPr/>
+        </p:nvSpPr>
+        <p:spPr>
+          <a:xfrm>
+            <a:off x="4777153" y="1201615"/>
+            <a:ext cx="3604846" cy="2290902"/>
+          </a:xfrm>
+          <a:prstGeom prst="rect">
+            <a:avLst/>
+          </a:prstGeom>
+          <a:noFill/>
+          <a:ln w="9525">
+            <a:solidFill>
+              <a:schemeClr val="accent1"/>
+            </a:solidFill>
+            <a:prstDash val="lgDash"/>
+          </a:ln>
+        </p:spPr>
+        <p:style>
+          <a:lnRef idx="2">
+            <a:schemeClr val="accent1">
+              <a:shade val="50000"/>
+            </a:schemeClr>
+          </a:lnRef>
+          <a:fillRef idx="1">
+            <a:schemeClr val="accent1"/>
+          </a:fillRef>
+          <a:effectRef idx="0">
+            <a:schemeClr val="accent1"/>
+          </a:effectRef>
+          <a:fontRef idx="minor">
+            <a:schemeClr val="lt1"/>
+          </a:fontRef>
+        </p:style>
+        <p:txBody>
+          <a:bodyPr rtlCol="0" anchor="ctr"/>
+          <a:lstStyle/>
+          <a:p>
+            <a:pPr algn="ctr"/>
+            <a:endParaRPr lang="en-US"/>
+          </a:p>
+        </p:txBody>
+      </p:sp>
+      <p:sp>
+        <p:nvSpPr>
+          <p:cNvPr id="7" name="Rectangle 6"/>
+          <p:cNvSpPr/>
+          <p:nvPr/>
+        </p:nvSpPr>
+        <p:spPr>
+          <a:xfrm>
+            <a:off x="4954094" y="2140352"/>
+            <a:ext cx="3289539" cy="1221846"/>
+          </a:xfrm>
+          <a:prstGeom prst="rect">
+            <a:avLst/>
+          </a:prstGeom>
+          <a:noFill/>
+          <a:ln w="9525">
+            <a:solidFill>
+              <a:schemeClr val="accent1"/>
+            </a:solidFill>
+            <a:prstDash val="lgDash"/>
+          </a:ln>
+        </p:spPr>
+        <p:style>
+          <a:lnRef idx="2">
+            <a:schemeClr val="accent1">
+              <a:shade val="50000"/>
+            </a:schemeClr>
+          </a:lnRef>
+          <a:fillRef idx="1">
+            <a:schemeClr val="accent1"/>
+          </a:fillRef>
+          <a:effectRef idx="0">
+            <a:schemeClr val="accent1"/>
+          </a:effectRef>
+          <a:fontRef idx="minor">
+            <a:schemeClr val="lt1"/>
+          </a:fontRef>
+        </p:style>
+        <p:txBody>
+          <a:bodyPr rtlCol="0" anchor="ctr"/>
+          <a:lstStyle/>
+          <a:p>
+            <a:pPr algn="ctr"/>
+            <a:endParaRPr lang="en-US"/>
+          </a:p>
+        </p:txBody>
+      </p:sp>
+      <p:pic>
+        <p:nvPicPr>
+          <p:cNvPr id="8" name="Picture 10" descr="http://puu.sh/nYudf/fbcd0b5361.png"/>
+          <p:cNvPicPr>
+            <a:picLocks noChangeAspect="1" noChangeArrowheads="1"/>
+          </p:cNvPicPr>
+          <p:nvPr/>
+        </p:nvPicPr>
+        <p:blipFill>
+          <a:blip r:embed="rId4">
+            <a:extLst>
+              <a:ext uri="{28A0092B-C50C-407E-A947-70E740481C1C}">
+                <a14:useLocalDpi xmlns:a14="http://schemas.microsoft.com/office/drawing/2010/main" val="0"/>
+              </a:ext>
+            </a:extLst>
+          </a:blip>
+          <a:srcRect/>
+          <a:stretch>
+            <a:fillRect/>
+          </a:stretch>
+        </p:blipFill>
+        <p:spPr bwMode="auto">
+          <a:xfrm>
+            <a:off x="4959957" y="2886024"/>
+            <a:ext cx="3267076" cy="228600"/>
+          </a:xfrm>
+          <a:prstGeom prst="rect">
+            <a:avLst/>
+          </a:prstGeom>
+          <a:noFill/>
+          <a:extLst>
+            <a:ext uri="{909E8E84-426E-40DD-AFC4-6F175D3DCCD1}">
+              <a14:hiddenFill xmlns:a14="http://schemas.microsoft.com/office/drawing/2010/main">
+                <a:solidFill>
+                  <a:srgbClr val="FFFFFF"/>
+                </a:solidFill>
+              </a14:hiddenFill>
+            </a:ext>
+          </a:extLst>
+        </p:spPr>
+      </p:pic>
+      <p:sp>
+        <p:nvSpPr>
+          <p:cNvPr id="9" name="Smiley Face 8"/>
+          <p:cNvSpPr/>
+          <p:nvPr/>
+        </p:nvSpPr>
+        <p:spPr>
+          <a:xfrm>
+            <a:off x="2316445" y="2604670"/>
+            <a:ext cx="785446" cy="791308"/>
+          </a:xfrm>
+          <a:prstGeom prst="smileyFace">
+            <a:avLst/>
+          </a:prstGeom>
+        </p:spPr>
+        <p:style>
+          <a:lnRef idx="2">
+            <a:schemeClr val="accent1">
+              <a:shade val="50000"/>
+            </a:schemeClr>
+          </a:lnRef>
+          <a:fillRef idx="1">
+            <a:schemeClr val="accent1"/>
+          </a:fillRef>
+          <a:effectRef idx="0">
+            <a:schemeClr val="accent1"/>
+          </a:effectRef>
+          <a:fontRef idx="minor">
+            <a:schemeClr val="lt1"/>
+          </a:fontRef>
+        </p:style>
+        <p:txBody>
+          <a:bodyPr rtlCol="0" anchor="ctr"/>
+          <a:lstStyle/>
+          <a:p>
+            <a:pPr algn="ctr"/>
+            <a:endParaRPr lang="en-US"/>
+          </a:p>
+        </p:txBody>
+      </p:sp>
+      <p:cxnSp>
+        <p:nvCxnSpPr>
+          <p:cNvPr id="11" name="Straight Arrow Connector 10"/>
+          <p:cNvCxnSpPr>
+            <a:stCxn id="9" idx="6"/>
+            <a:endCxn id="8" idx="1"/>
+          </p:cNvCxnSpPr>
+          <p:nvPr/>
+        </p:nvCxnSpPr>
+        <p:spPr>
+          <a:xfrm>
+            <a:off x="3101891" y="3000324"/>
+            <a:ext cx="1858066" cy="0"/>
+          </a:xfrm>
+          <a:prstGeom prst="straightConnector1">
+            <a:avLst/>
+          </a:prstGeom>
+          <a:ln w="28575">
+            <a:tailEnd type="triangle"/>
+          </a:ln>
+        </p:spPr>
+        <p:style>
+          <a:lnRef idx="1">
+            <a:schemeClr val="accent1"/>
+          </a:lnRef>
+          <a:fillRef idx="0">
+            <a:schemeClr val="accent1"/>
+          </a:fillRef>
+          <a:effectRef idx="0">
+            <a:schemeClr val="accent1"/>
+          </a:effectRef>
+          <a:fontRef idx="minor">
+            <a:schemeClr val="tx1"/>
+          </a:fontRef>
+        </p:style>
+      </p:cxnSp>
+      <p:sp>
+        <p:nvSpPr>
+          <p:cNvPr id="13" name="Smiley Face 12"/>
+          <p:cNvSpPr/>
+          <p:nvPr/>
+        </p:nvSpPr>
+        <p:spPr>
+          <a:xfrm>
+            <a:off x="5192124" y="4575529"/>
+            <a:ext cx="785446" cy="791308"/>
+          </a:xfrm>
+          <a:prstGeom prst="smileyFace">
+            <a:avLst/>
+          </a:prstGeom>
+        </p:spPr>
+        <p:style>
+          <a:lnRef idx="2">
+            <a:schemeClr val="accent1">
+              <a:shade val="50000"/>
+            </a:schemeClr>
+          </a:lnRef>
+          <a:fillRef idx="1">
+            <a:schemeClr val="accent1"/>
+          </a:fillRef>
+          <a:effectRef idx="0">
+            <a:schemeClr val="accent1"/>
+          </a:effectRef>
+          <a:fontRef idx="minor">
+            <a:schemeClr val="lt1"/>
+          </a:fontRef>
+        </p:style>
+        <p:txBody>
+          <a:bodyPr rtlCol="0" anchor="ctr"/>
+          <a:lstStyle/>
+          <a:p>
+            <a:pPr algn="ctr"/>
+            <a:endParaRPr lang="en-US"/>
+          </a:p>
+        </p:txBody>
+      </p:sp>
+      <p:sp>
+        <p:nvSpPr>
+          <p:cNvPr id="14" name="Smiley Face 13"/>
+          <p:cNvSpPr/>
+          <p:nvPr/>
+        </p:nvSpPr>
+        <p:spPr>
+          <a:xfrm>
+            <a:off x="6195639" y="4575529"/>
+            <a:ext cx="785446" cy="791308"/>
+          </a:xfrm>
+          <a:prstGeom prst="smileyFace">
+            <a:avLst/>
+          </a:prstGeom>
+        </p:spPr>
+        <p:style>
+          <a:lnRef idx="2">
+            <a:schemeClr val="accent1">
+              <a:shade val="50000"/>
+            </a:schemeClr>
+          </a:lnRef>
+          <a:fillRef idx="1">
+            <a:schemeClr val="accent1"/>
+          </a:fillRef>
+          <a:effectRef idx="0">
+            <a:schemeClr val="accent1"/>
+          </a:effectRef>
+          <a:fontRef idx="minor">
+            <a:schemeClr val="lt1"/>
+          </a:fontRef>
+        </p:style>
+        <p:txBody>
+          <a:bodyPr rtlCol="0" anchor="ctr"/>
+          <a:lstStyle/>
+          <a:p>
+            <a:pPr algn="ctr"/>
+            <a:endParaRPr lang="en-US"/>
+          </a:p>
+        </p:txBody>
+      </p:sp>
+      <p:sp>
+        <p:nvSpPr>
+          <p:cNvPr id="15" name="Smiley Face 14"/>
+          <p:cNvSpPr/>
+          <p:nvPr/>
+        </p:nvSpPr>
+        <p:spPr>
+          <a:xfrm>
+            <a:off x="7199154" y="4575529"/>
+            <a:ext cx="785446" cy="791308"/>
+          </a:xfrm>
+          <a:prstGeom prst="smileyFace">
+            <a:avLst/>
+          </a:prstGeom>
+        </p:spPr>
+        <p:style>
+          <a:lnRef idx="2">
+            <a:schemeClr val="accent1">
+              <a:shade val="50000"/>
+            </a:schemeClr>
+          </a:lnRef>
+          <a:fillRef idx="1">
+            <a:schemeClr val="accent1"/>
+          </a:fillRef>
+          <a:effectRef idx="0">
+            <a:schemeClr val="accent1"/>
+          </a:effectRef>
+          <a:fontRef idx="minor">
+            <a:schemeClr val="lt1"/>
+          </a:fontRef>
+        </p:style>
+        <p:txBody>
+          <a:bodyPr rtlCol="0" anchor="ctr"/>
+          <a:lstStyle/>
+          <a:p>
+            <a:pPr algn="ctr"/>
+            <a:endParaRPr lang="en-US"/>
+          </a:p>
+        </p:txBody>
+      </p:sp>
+      <p:cxnSp>
+        <p:nvCxnSpPr>
+          <p:cNvPr id="19" name="Straight Arrow Connector 18"/>
+          <p:cNvCxnSpPr>
+            <a:endCxn id="13" idx="0"/>
+          </p:cNvCxnSpPr>
+          <p:nvPr/>
+        </p:nvCxnSpPr>
+        <p:spPr>
+          <a:xfrm flipH="1">
+            <a:off x="5584847" y="3114624"/>
+            <a:ext cx="1860495" cy="1460905"/>
+          </a:xfrm>
+          <a:prstGeom prst="straightConnector1">
+            <a:avLst/>
+          </a:prstGeom>
+          <a:ln w="28575">
+            <a:tailEnd type="triangle"/>
+          </a:ln>
+        </p:spPr>
+        <p:style>
+          <a:lnRef idx="1">
+            <a:schemeClr val="accent1"/>
+          </a:lnRef>
+          <a:fillRef idx="0">
+            <a:schemeClr val="accent1"/>
+          </a:fillRef>
+          <a:effectRef idx="0">
+            <a:schemeClr val="accent1"/>
+          </a:effectRef>
+          <a:fontRef idx="minor">
+            <a:schemeClr val="tx1"/>
+          </a:fontRef>
+        </p:style>
+      </p:cxnSp>
+      <p:cxnSp>
+        <p:nvCxnSpPr>
+          <p:cNvPr id="21" name="Straight Arrow Connector 20"/>
+          <p:cNvCxnSpPr>
+            <a:endCxn id="14" idx="0"/>
+          </p:cNvCxnSpPr>
+          <p:nvPr/>
+        </p:nvCxnSpPr>
+        <p:spPr>
+          <a:xfrm flipH="1">
+            <a:off x="6588362" y="3114624"/>
+            <a:ext cx="856980" cy="1460905"/>
+          </a:xfrm>
+          <a:prstGeom prst="straightConnector1">
+            <a:avLst/>
+          </a:prstGeom>
+          <a:ln w="28575">
+            <a:tailEnd type="triangle"/>
+          </a:ln>
+        </p:spPr>
+        <p:style>
+          <a:lnRef idx="1">
+            <a:schemeClr val="accent1"/>
+          </a:lnRef>
+          <a:fillRef idx="0">
+            <a:schemeClr val="accent1"/>
+          </a:fillRef>
+          <a:effectRef idx="0">
+            <a:schemeClr val="accent1"/>
+          </a:effectRef>
+          <a:fontRef idx="minor">
+            <a:schemeClr val="tx1"/>
+          </a:fontRef>
+        </p:style>
+      </p:cxnSp>
+      <p:cxnSp>
+        <p:nvCxnSpPr>
+          <p:cNvPr id="23" name="Straight Arrow Connector 22"/>
+          <p:cNvCxnSpPr>
+            <a:endCxn id="15" idx="0"/>
+          </p:cNvCxnSpPr>
+          <p:nvPr/>
+        </p:nvCxnSpPr>
+        <p:spPr>
+          <a:xfrm>
+            <a:off x="7445342" y="3114624"/>
+            <a:ext cx="146535" cy="1460905"/>
+          </a:xfrm>
+          <a:prstGeom prst="straightConnector1">
+            <a:avLst/>
+          </a:prstGeom>
+          <a:ln w="28575">
+            <a:tailEnd type="triangle"/>
+          </a:ln>
+        </p:spPr>
+        <p:style>
+          <a:lnRef idx="1">
+            <a:schemeClr val="accent1"/>
+          </a:lnRef>
+          <a:fillRef idx="0">
+            <a:schemeClr val="accent1"/>
+          </a:fillRef>
+          <a:effectRef idx="0">
+            <a:schemeClr val="accent1"/>
+          </a:effectRef>
+          <a:fontRef idx="minor">
+            <a:schemeClr val="tx1"/>
+          </a:fontRef>
+        </p:style>
+      </p:cxnSp>
+      <p:cxnSp>
+        <p:nvCxnSpPr>
+          <p:cNvPr id="27" name="Elbow Connector 26"/>
+          <p:cNvCxnSpPr>
+            <a:endCxn id="9" idx="4"/>
+          </p:cNvCxnSpPr>
+          <p:nvPr/>
+        </p:nvCxnSpPr>
+        <p:spPr>
+          <a:xfrm rot="10800000" flipV="1">
+            <a:off x="2709168" y="3114624"/>
+            <a:ext cx="4736174" cy="281354"/>
+          </a:xfrm>
+          <a:prstGeom prst="bentConnector4">
+            <a:avLst>
+              <a:gd name="adj1" fmla="val 1052"/>
+              <a:gd name="adj2" fmla="val 181250"/>
+            </a:avLst>
+          </a:prstGeom>
+          <a:ln w="28575">
+            <a:tailEnd type="triangle"/>
+          </a:ln>
+        </p:spPr>
+        <p:style>
+          <a:lnRef idx="1">
+            <a:schemeClr val="accent1"/>
+          </a:lnRef>
+          <a:fillRef idx="0">
+            <a:schemeClr val="accent1"/>
+          </a:fillRef>
+          <a:effectRef idx="0">
+            <a:schemeClr val="accent1"/>
+          </a:effectRef>
+          <a:fontRef idx="minor">
+            <a:schemeClr val="tx1"/>
+          </a:fontRef>
+        </p:style>
+      </p:cxnSp>
+      <p:sp>
+        <p:nvSpPr>
+          <p:cNvPr id="33" name="TextBox 32"/>
+          <p:cNvSpPr txBox="1"/>
+          <p:nvPr/>
+        </p:nvSpPr>
+        <p:spPr>
+          <a:xfrm>
+            <a:off x="3182103" y="2630992"/>
+            <a:ext cx="1514838" cy="369332"/>
+          </a:xfrm>
+          <a:prstGeom prst="rect">
+            <a:avLst/>
+          </a:prstGeom>
+          <a:noFill/>
+        </p:spPr>
+        <p:txBody>
+          <a:bodyPr wrap="none" rtlCol="0">
+            <a:spAutoFit/>
+          </a:bodyPr>
+          <a:lstStyle/>
+          <a:p>
+            <a:r>
+              <a:rPr lang="en-US" dirty="0"/>
+              <a:t>Send message</a:t>
+            </a:r>
+          </a:p>
+        </p:txBody>
+      </p:sp>
+      <p:sp>
+        <p:nvSpPr>
+          <p:cNvPr id="35" name="TextBox 34"/>
+          <p:cNvSpPr txBox="1"/>
+          <p:nvPr/>
+        </p:nvSpPr>
+        <p:spPr>
+          <a:xfrm>
+            <a:off x="7457065" y="3791632"/>
+            <a:ext cx="1156086" cy="261610"/>
+          </a:xfrm>
+          <a:prstGeom prst="rect">
+            <a:avLst/>
+          </a:prstGeom>
+          <a:noFill/>
+        </p:spPr>
+        <p:txBody>
+          <a:bodyPr wrap="none" rtlCol="0">
+            <a:spAutoFit/>
+          </a:bodyPr>
+          <a:lstStyle/>
+          <a:p>
+            <a:r>
+              <a:rPr lang="en-US" sz="1100" dirty="0"/>
+              <a:t>Receive message</a:t>
+            </a:r>
+          </a:p>
+        </p:txBody>
+      </p:sp>
+      <p:sp>
+        <p:nvSpPr>
+          <p:cNvPr id="37" name="TextBox 36"/>
+          <p:cNvSpPr txBox="1"/>
+          <p:nvPr/>
+        </p:nvSpPr>
+        <p:spPr>
+          <a:xfrm>
+            <a:off x="5245867" y="3792406"/>
+            <a:ext cx="1156086" cy="261610"/>
+          </a:xfrm>
+          <a:prstGeom prst="rect">
+            <a:avLst/>
+          </a:prstGeom>
+          <a:noFill/>
+        </p:spPr>
+        <p:txBody>
+          <a:bodyPr wrap="none" rtlCol="0">
+            <a:spAutoFit/>
+          </a:bodyPr>
+          <a:lstStyle/>
+          <a:p>
+            <a:r>
+              <a:rPr lang="en-US" sz="1100" dirty="0"/>
+              <a:t>Receive message</a:t>
+            </a:r>
+          </a:p>
+        </p:txBody>
+      </p:sp>
+      <p:sp>
+        <p:nvSpPr>
+          <p:cNvPr id="38" name="TextBox 37"/>
+          <p:cNvSpPr txBox="1"/>
+          <p:nvPr/>
+        </p:nvSpPr>
+        <p:spPr>
+          <a:xfrm>
+            <a:off x="6215543" y="4135743"/>
+            <a:ext cx="1156086" cy="261610"/>
+          </a:xfrm>
+          <a:prstGeom prst="rect">
+            <a:avLst/>
+          </a:prstGeom>
+          <a:noFill/>
+        </p:spPr>
+        <p:txBody>
+          <a:bodyPr wrap="none" rtlCol="0">
+            <a:spAutoFit/>
+          </a:bodyPr>
+          <a:lstStyle/>
+          <a:p>
+            <a:r>
+              <a:rPr lang="en-US" sz="1100" dirty="0"/>
+              <a:t>Receive message</a:t>
+            </a:r>
+          </a:p>
+        </p:txBody>
+      </p:sp>
+      <p:sp>
+        <p:nvSpPr>
+          <p:cNvPr id="39" name="TextBox 38"/>
+          <p:cNvSpPr txBox="1"/>
+          <p:nvPr/>
+        </p:nvSpPr>
+        <p:spPr>
+          <a:xfrm>
+            <a:off x="2604060" y="3597617"/>
+            <a:ext cx="1156086" cy="261610"/>
+          </a:xfrm>
+          <a:prstGeom prst="rect">
+            <a:avLst/>
+          </a:prstGeom>
+          <a:noFill/>
+        </p:spPr>
+        <p:txBody>
+          <a:bodyPr wrap="none" rtlCol="0">
+            <a:spAutoFit/>
+          </a:bodyPr>
+          <a:lstStyle/>
+          <a:p>
+            <a:r>
+              <a:rPr lang="en-US" sz="1100" dirty="0"/>
+              <a:t>Receive message</a:t>
+            </a:r>
+          </a:p>
+        </p:txBody>
+      </p:sp>
+    </p:spTree>
+    <p:extLst>
+      <p:ext uri="{BB962C8B-B14F-4D97-AF65-F5344CB8AC3E}">
+        <p14:creationId xmlns:p14="http://schemas.microsoft.com/office/powerpoint/2010/main" val="1429424854"/>
+      </p:ext>
+    </p:extLst>
+  </p:cSld>
+  <p:clrMapOvr>
+    <a:masterClrMapping/>
+  </p:clrMapOvr>
+  <mc:AlternateContent xmlns:mc="http://schemas.openxmlformats.org/markup-compatibility/2006" xmlns:p14="http://schemas.microsoft.com/office/powerpoint/2010/main">
+    <mc:Choice Requires="p14">
+      <p:transition spd="med" p14:dur="700">
+        <p:fade/>
+      </p:transition>
+    </mc:Choice>
+    <mc:Fallback xmlns="">
+      <p:transition spd="med">
+        <p:fade/>
+      </p:transition>
+    </mc:Fallback>
+  </mc:AlternateContent>
+</p:sld>
+</file>
+
+<file path=ppt/slides/slide14.xml><?xml version="1.0" encoding="utf-8"?>
 <p:sld xmlns:a="http://schemas.openxmlformats.org/drawingml/2006/main" xmlns:r="http://schemas.openxmlformats.org/officeDocument/2006/relationships" xmlns:p="http://schemas.openxmlformats.org/presentationml/2006/main">
   <p:cSld>
     <p:spTree>

</xml_diff>